<commit_message>
Added stuff for Graphics day 3 class
</commit_message>
<xml_diff>
--- a/6028_Graph_1/D2D/W01/INFO6028_Graphics_1_F23_W01D01_Course_Intro.pptx
+++ b/6028_Graph_1/D2D/W01/INFO6028_Graphics_1_F23_W01D01_Course_Intro.pptx
@@ -5,7 +5,7 @@
     <p:sldMasterId id="2147483708" r:id="rId1"/>
   </p:sldMasterIdLst>
   <p:notesMasterIdLst>
-    <p:notesMasterId r:id="rId41"/>
+    <p:notesMasterId r:id="rId44"/>
   </p:notesMasterIdLst>
   <p:sldIdLst>
     <p:sldId id="450" r:id="rId2"/>
@@ -46,7 +46,10 @@
     <p:sldId id="490" r:id="rId37"/>
     <p:sldId id="489" r:id="rId38"/>
     <p:sldId id="497" r:id="rId39"/>
-    <p:sldId id="367" r:id="rId40"/>
+    <p:sldId id="499" r:id="rId40"/>
+    <p:sldId id="498" r:id="rId41"/>
+    <p:sldId id="500" r:id="rId42"/>
+    <p:sldId id="367" r:id="rId43"/>
   </p:sldIdLst>
   <p:sldSz cx="9144000" cy="5143500" type="screen16x9"/>
   <p:notesSz cx="6858000" cy="9144000"/>
@@ -22258,6 +22261,2018 @@
           <a:chExt cx="0" cy="0"/>
         </a:xfrm>
       </p:grpSpPr>
+      <p:sp>
+        <p:nvSpPr>
+          <p:cNvPr id="10" name="Rectangle: Rounded Corners 9">
+            <a:extLst>
+              <a:ext uri="{FF2B5EF4-FFF2-40B4-BE49-F238E27FC236}">
+                <a16:creationId xmlns:a16="http://schemas.microsoft.com/office/drawing/2014/main" id="{75D3367F-738E-97C0-54E4-E97CE69A7510}"/>
+              </a:ext>
+            </a:extLst>
+          </p:cNvPr>
+          <p:cNvSpPr/>
+          <p:nvPr/>
+        </p:nvSpPr>
+        <p:spPr>
+          <a:xfrm>
+            <a:off x="4953000" y="57150"/>
+            <a:ext cx="3962400" cy="4419600"/>
+          </a:xfrm>
+          <a:prstGeom prst="roundRect">
+            <a:avLst/>
+          </a:prstGeom>
+        </p:spPr>
+        <p:style>
+          <a:lnRef idx="3">
+            <a:schemeClr val="lt1"/>
+          </a:lnRef>
+          <a:fillRef idx="1">
+            <a:schemeClr val="accent3"/>
+          </a:fillRef>
+          <a:effectRef idx="1">
+            <a:schemeClr val="accent3"/>
+          </a:effectRef>
+          <a:fontRef idx="minor">
+            <a:schemeClr val="lt1"/>
+          </a:fontRef>
+        </p:style>
+        <p:txBody>
+          <a:bodyPr rtlCol="0" anchor="ctr"/>
+          <a:lstStyle/>
+          <a:p>
+            <a:pPr algn="ctr"/>
+            <a:endParaRPr lang="en-CA"/>
+          </a:p>
+        </p:txBody>
+      </p:sp>
+      <p:sp>
+        <p:nvSpPr>
+          <p:cNvPr id="9" name="Rectangle: Rounded Corners 8">
+            <a:extLst>
+              <a:ext uri="{FF2B5EF4-FFF2-40B4-BE49-F238E27FC236}">
+                <a16:creationId xmlns:a16="http://schemas.microsoft.com/office/drawing/2014/main" id="{CBCA217C-C33E-141D-139B-705071437070}"/>
+              </a:ext>
+            </a:extLst>
+          </p:cNvPr>
+          <p:cNvSpPr/>
+          <p:nvPr/>
+        </p:nvSpPr>
+        <p:spPr>
+          <a:xfrm>
+            <a:off x="-152400" y="895350"/>
+            <a:ext cx="2590800" cy="2819400"/>
+          </a:xfrm>
+          <a:prstGeom prst="roundRect">
+            <a:avLst/>
+          </a:prstGeom>
+        </p:spPr>
+        <p:style>
+          <a:lnRef idx="3">
+            <a:schemeClr val="lt1"/>
+          </a:lnRef>
+          <a:fillRef idx="1">
+            <a:schemeClr val="accent3"/>
+          </a:fillRef>
+          <a:effectRef idx="1">
+            <a:schemeClr val="accent3"/>
+          </a:effectRef>
+          <a:fontRef idx="minor">
+            <a:schemeClr val="lt1"/>
+          </a:fontRef>
+        </p:style>
+        <p:txBody>
+          <a:bodyPr rtlCol="0" anchor="ctr"/>
+          <a:lstStyle/>
+          <a:p>
+            <a:pPr algn="ctr"/>
+            <a:endParaRPr lang="en-CA"/>
+          </a:p>
+        </p:txBody>
+      </p:sp>
+      <p:sp>
+        <p:nvSpPr>
+          <p:cNvPr id="4" name="Rectangle: Rounded Corners 3">
+            <a:extLst>
+              <a:ext uri="{FF2B5EF4-FFF2-40B4-BE49-F238E27FC236}">
+                <a16:creationId xmlns:a16="http://schemas.microsoft.com/office/drawing/2014/main" id="{CE90FFEE-AC7E-C883-783F-4C067C53D87B}"/>
+              </a:ext>
+            </a:extLst>
+          </p:cNvPr>
+          <p:cNvSpPr/>
+          <p:nvPr/>
+        </p:nvSpPr>
+        <p:spPr>
+          <a:xfrm>
+            <a:off x="2865120" y="1212532"/>
+            <a:ext cx="1623060" cy="2032635"/>
+          </a:xfrm>
+          <a:prstGeom prst="roundRect">
+            <a:avLst/>
+          </a:prstGeom>
+        </p:spPr>
+        <p:style>
+          <a:lnRef idx="2">
+            <a:schemeClr val="accent1">
+              <a:shade val="15000"/>
+            </a:schemeClr>
+          </a:lnRef>
+          <a:fillRef idx="1">
+            <a:schemeClr val="accent1"/>
+          </a:fillRef>
+          <a:effectRef idx="0">
+            <a:schemeClr val="accent1"/>
+          </a:effectRef>
+          <a:fontRef idx="minor">
+            <a:schemeClr val="lt1"/>
+          </a:fontRef>
+        </p:style>
+        <p:txBody>
+          <a:bodyPr rtlCol="0" anchor="ctr"/>
+          <a:lstStyle/>
+          <a:p>
+            <a:pPr algn="ctr"/>
+            <a:r>
+              <a:rPr lang="en-CA" dirty="0"/>
+              <a:t>OpenGL</a:t>
+            </a:r>
+          </a:p>
+          <a:p>
+            <a:pPr algn="ctr"/>
+            <a:r>
+              <a:rPr lang="en-CA" dirty="0"/>
+              <a:t>“machine unit”</a:t>
+            </a:r>
+          </a:p>
+          <a:p>
+            <a:pPr algn="ctr"/>
+            <a:r>
+              <a:rPr lang="en-CA" dirty="0"/>
+              <a:t>byte</a:t>
+            </a:r>
+          </a:p>
+        </p:txBody>
+      </p:sp>
+      <p:sp>
+        <p:nvSpPr>
+          <p:cNvPr id="5" name="Rectangle 4">
+            <a:extLst>
+              <a:ext uri="{FF2B5EF4-FFF2-40B4-BE49-F238E27FC236}">
+                <a16:creationId xmlns:a16="http://schemas.microsoft.com/office/drawing/2014/main" id="{C4DE542D-6E92-7503-9416-D4B87C53712D}"/>
+              </a:ext>
+            </a:extLst>
+          </p:cNvPr>
+          <p:cNvSpPr/>
+          <p:nvPr/>
+        </p:nvSpPr>
+        <p:spPr>
+          <a:xfrm>
+            <a:off x="5257800" y="590550"/>
+            <a:ext cx="1828800" cy="3276600"/>
+          </a:xfrm>
+          <a:prstGeom prst="rect">
+            <a:avLst/>
+          </a:prstGeom>
+        </p:spPr>
+        <p:style>
+          <a:lnRef idx="2">
+            <a:schemeClr val="accent1">
+              <a:shade val="15000"/>
+            </a:schemeClr>
+          </a:lnRef>
+          <a:fillRef idx="1">
+            <a:schemeClr val="accent1"/>
+          </a:fillRef>
+          <a:effectRef idx="0">
+            <a:schemeClr val="accent1"/>
+          </a:effectRef>
+          <a:fontRef idx="minor">
+            <a:schemeClr val="lt1"/>
+          </a:fontRef>
+        </p:style>
+        <p:txBody>
+          <a:bodyPr rtlCol="0" anchor="ctr"/>
+          <a:lstStyle/>
+          <a:p>
+            <a:pPr algn="ctr"/>
+            <a:r>
+              <a:rPr lang="en-CA" dirty="0" err="1"/>
+              <a:t>FrameBuffer</a:t>
+            </a:r>
+            <a:endParaRPr lang="en-CA" dirty="0"/>
+          </a:p>
+          <a:p>
+            <a:pPr algn="ctr"/>
+            <a:r>
+              <a:rPr lang="en-CA" dirty="0"/>
+              <a:t>(2D array)</a:t>
+            </a:r>
+          </a:p>
+        </p:txBody>
+      </p:sp>
+      <p:sp>
+        <p:nvSpPr>
+          <p:cNvPr id="6" name="Rectangle: Diagonal Corners Rounded 5">
+            <a:extLst>
+              <a:ext uri="{FF2B5EF4-FFF2-40B4-BE49-F238E27FC236}">
+                <a16:creationId xmlns:a16="http://schemas.microsoft.com/office/drawing/2014/main" id="{55D3CC22-F543-A3BC-E7B9-8658D8687F83}"/>
+              </a:ext>
+            </a:extLst>
+          </p:cNvPr>
+          <p:cNvSpPr/>
+          <p:nvPr/>
+        </p:nvSpPr>
+        <p:spPr>
+          <a:xfrm>
+            <a:off x="0" y="1733550"/>
+            <a:ext cx="2133600" cy="1066800"/>
+          </a:xfrm>
+          <a:prstGeom prst="round2DiagRect">
+            <a:avLst/>
+          </a:prstGeom>
+        </p:spPr>
+        <p:style>
+          <a:lnRef idx="2">
+            <a:schemeClr val="accent1">
+              <a:shade val="15000"/>
+            </a:schemeClr>
+          </a:lnRef>
+          <a:fillRef idx="1">
+            <a:schemeClr val="accent1"/>
+          </a:fillRef>
+          <a:effectRef idx="0">
+            <a:schemeClr val="accent1"/>
+          </a:effectRef>
+          <a:fontRef idx="minor">
+            <a:schemeClr val="lt1"/>
+          </a:fontRef>
+        </p:style>
+        <p:txBody>
+          <a:bodyPr rtlCol="0" anchor="ctr"/>
+          <a:lstStyle/>
+          <a:p>
+            <a:pPr algn="ctr"/>
+            <a:r>
+              <a:rPr lang="en-CA" dirty="0"/>
+              <a:t>Yer program</a:t>
+            </a:r>
+          </a:p>
+        </p:txBody>
+      </p:sp>
+      <p:sp>
+        <p:nvSpPr>
+          <p:cNvPr id="7" name="Arrow: Right 6">
+            <a:extLst>
+              <a:ext uri="{FF2B5EF4-FFF2-40B4-BE49-F238E27FC236}">
+                <a16:creationId xmlns:a16="http://schemas.microsoft.com/office/drawing/2014/main" id="{ACA15230-9B52-B213-65F9-EE285A32B83D}"/>
+              </a:ext>
+            </a:extLst>
+          </p:cNvPr>
+          <p:cNvSpPr/>
+          <p:nvPr/>
+        </p:nvSpPr>
+        <p:spPr>
+          <a:xfrm>
+            <a:off x="2133600" y="1962150"/>
+            <a:ext cx="685800" cy="533400"/>
+          </a:xfrm>
+          <a:prstGeom prst="rightArrow">
+            <a:avLst/>
+          </a:prstGeom>
+        </p:spPr>
+        <p:style>
+          <a:lnRef idx="2">
+            <a:schemeClr val="accent1">
+              <a:shade val="15000"/>
+            </a:schemeClr>
+          </a:lnRef>
+          <a:fillRef idx="1">
+            <a:schemeClr val="accent1"/>
+          </a:fillRef>
+          <a:effectRef idx="0">
+            <a:schemeClr val="accent1"/>
+          </a:effectRef>
+          <a:fontRef idx="minor">
+            <a:schemeClr val="lt1"/>
+          </a:fontRef>
+        </p:style>
+        <p:txBody>
+          <a:bodyPr rtlCol="0" anchor="ctr"/>
+          <a:lstStyle/>
+          <a:p>
+            <a:pPr algn="ctr"/>
+            <a:endParaRPr lang="en-CA"/>
+          </a:p>
+        </p:txBody>
+      </p:sp>
+      <p:sp>
+        <p:nvSpPr>
+          <p:cNvPr id="8" name="Arrow: Right 7">
+            <a:extLst>
+              <a:ext uri="{FF2B5EF4-FFF2-40B4-BE49-F238E27FC236}">
+                <a16:creationId xmlns:a16="http://schemas.microsoft.com/office/drawing/2014/main" id="{69E37798-AE55-7728-9CC8-3FFBD057F979}"/>
+              </a:ext>
+            </a:extLst>
+          </p:cNvPr>
+          <p:cNvSpPr/>
+          <p:nvPr/>
+        </p:nvSpPr>
+        <p:spPr>
+          <a:xfrm>
+            <a:off x="4488180" y="1962150"/>
+            <a:ext cx="769620" cy="533400"/>
+          </a:xfrm>
+          <a:prstGeom prst="rightArrow">
+            <a:avLst/>
+          </a:prstGeom>
+        </p:spPr>
+        <p:style>
+          <a:lnRef idx="2">
+            <a:schemeClr val="accent1">
+              <a:shade val="15000"/>
+            </a:schemeClr>
+          </a:lnRef>
+          <a:fillRef idx="1">
+            <a:schemeClr val="accent1"/>
+          </a:fillRef>
+          <a:effectRef idx="0">
+            <a:schemeClr val="accent1"/>
+          </a:effectRef>
+          <a:fontRef idx="minor">
+            <a:schemeClr val="lt1"/>
+          </a:fontRef>
+        </p:style>
+        <p:txBody>
+          <a:bodyPr rtlCol="0" anchor="ctr"/>
+          <a:lstStyle/>
+          <a:p>
+            <a:pPr algn="ctr"/>
+            <a:endParaRPr lang="en-CA"/>
+          </a:p>
+        </p:txBody>
+      </p:sp>
+      <p:sp>
+        <p:nvSpPr>
+          <p:cNvPr id="11" name="Rectangle: Rounded Corners 10">
+            <a:extLst>
+              <a:ext uri="{FF2B5EF4-FFF2-40B4-BE49-F238E27FC236}">
+                <a16:creationId xmlns:a16="http://schemas.microsoft.com/office/drawing/2014/main" id="{09A609D0-6D75-50B3-B95C-51FECF502DDC}"/>
+              </a:ext>
+            </a:extLst>
+          </p:cNvPr>
+          <p:cNvSpPr/>
+          <p:nvPr/>
+        </p:nvSpPr>
+        <p:spPr>
+          <a:xfrm>
+            <a:off x="7376160" y="1809750"/>
+            <a:ext cx="1295400" cy="990600"/>
+          </a:xfrm>
+          <a:prstGeom prst="roundRect">
+            <a:avLst/>
+          </a:prstGeom>
+        </p:spPr>
+        <p:style>
+          <a:lnRef idx="2">
+            <a:schemeClr val="accent1">
+              <a:shade val="15000"/>
+            </a:schemeClr>
+          </a:lnRef>
+          <a:fillRef idx="1">
+            <a:schemeClr val="accent1"/>
+          </a:fillRef>
+          <a:effectRef idx="0">
+            <a:schemeClr val="accent1"/>
+          </a:effectRef>
+          <a:fontRef idx="minor">
+            <a:schemeClr val="lt1"/>
+          </a:fontRef>
+        </p:style>
+        <p:txBody>
+          <a:bodyPr rtlCol="0" anchor="ctr"/>
+          <a:lstStyle/>
+          <a:p>
+            <a:pPr algn="ctr"/>
+            <a:r>
+              <a:rPr lang="en-CA" dirty="0"/>
+              <a:t>Screen</a:t>
+            </a:r>
+          </a:p>
+        </p:txBody>
+      </p:sp>
+    </p:spTree>
+    <p:extLst>
+      <p:ext uri="{BB962C8B-B14F-4D97-AF65-F5344CB8AC3E}">
+        <p14:creationId xmlns:p14="http://schemas.microsoft.com/office/powerpoint/2010/main" val="2115785434"/>
+      </p:ext>
+    </p:extLst>
+  </p:cSld>
+  <p:clrMapOvr>
+    <a:masterClrMapping/>
+  </p:clrMapOvr>
+</p:sld>
+</file>
+
+<file path=ppt/slides/slide4.xml><?xml version="1.0" encoding="utf-8"?>
+<p:sld xmlns:a="http://schemas.openxmlformats.org/drawingml/2006/main" xmlns:r="http://schemas.openxmlformats.org/officeDocument/2006/relationships" xmlns:p="http://schemas.openxmlformats.org/presentationml/2006/main">
+  <p:cSld>
+    <p:spTree>
+      <p:nvGrpSpPr>
+        <p:cNvPr id="1" name=""/>
+        <p:cNvGrpSpPr/>
+        <p:nvPr/>
+      </p:nvGrpSpPr>
+      <p:grpSpPr>
+        <a:xfrm>
+          <a:off x="0" y="0"/>
+          <a:ext cx="0" cy="0"/>
+          <a:chOff x="0" y="0"/>
+          <a:chExt cx="0" cy="0"/>
+        </a:xfrm>
+      </p:grpSpPr>
+      <p:sp>
+        <p:nvSpPr>
+          <p:cNvPr id="2" name="Title 1"/>
+          <p:cNvSpPr>
+            <a:spLocks noGrp="1"/>
+          </p:cNvSpPr>
+          <p:nvPr>
+            <p:ph type="title"/>
+          </p:nvPr>
+        </p:nvSpPr>
+        <p:spPr>
+          <a:xfrm>
+            <a:off x="457200" y="114300"/>
+            <a:ext cx="3200400" cy="914400"/>
+          </a:xfrm>
+        </p:spPr>
+        <p:txBody>
+          <a:bodyPr/>
+          <a:lstStyle/>
+          <a:p>
+            <a:pPr>
+              <a:defRPr/>
+            </a:pPr>
+            <a:r>
+              <a:rPr lang="en-CA" dirty="0"/>
+              <a:t>Text books:</a:t>
+            </a:r>
+          </a:p>
+        </p:txBody>
+      </p:sp>
+      <p:sp>
+        <p:nvSpPr>
+          <p:cNvPr id="3" name="Content Placeholder 2"/>
+          <p:cNvSpPr>
+            <a:spLocks noGrp="1"/>
+          </p:cNvSpPr>
+          <p:nvPr>
+            <p:ph idx="1"/>
+          </p:nvPr>
+        </p:nvSpPr>
+        <p:spPr>
+          <a:xfrm>
+            <a:off x="381000" y="1200150"/>
+            <a:ext cx="8229600" cy="3200400"/>
+          </a:xfrm>
+        </p:spPr>
+        <p:txBody>
+          <a:bodyPr>
+            <a:normAutofit fontScale="62500" lnSpcReduction="20000"/>
+          </a:bodyPr>
+          <a:lstStyle/>
+          <a:p>
+            <a:r>
+              <a:rPr lang="en-CA" sz="2600" dirty="0"/>
+              <a:t>The definitive source is </a:t>
+            </a:r>
+            <a:r>
+              <a:rPr lang="en-CA" sz="2600" dirty="0">
+                <a:hlinkClick r:id="rId2"/>
+              </a:rPr>
+              <a:t>www.opengl.org</a:t>
+            </a:r>
+            <a:r>
+              <a:rPr lang="en-CA" sz="2600" dirty="0"/>
+              <a:t> (though this is an OpenGL reference, not a “learn OpenGL” sort of thing. Certainly </a:t>
+            </a:r>
+            <a:r>
+              <a:rPr lang="en-CA" sz="2600" i="1" u="sng" dirty="0"/>
+              <a:t>not</a:t>
+            </a:r>
+            <a:r>
+              <a:rPr lang="en-CA" sz="2600" dirty="0"/>
+              <a:t> a “learn 3D graphics” site...)</a:t>
+            </a:r>
+            <a:endParaRPr lang="en-CA" sz="2300" dirty="0"/>
+          </a:p>
+          <a:p>
+            <a:r>
+              <a:rPr lang="en-CA" sz="2600" b="1" dirty="0"/>
+              <a:t>OpenGL </a:t>
+            </a:r>
+            <a:r>
+              <a:rPr lang="en-CA" sz="2600" b="1" dirty="0" err="1"/>
+              <a:t>SuperBible</a:t>
+            </a:r>
+            <a:r>
+              <a:rPr lang="en-CA" sz="2600" b="1" dirty="0"/>
+              <a:t>: Comprehensive Tutorial and Reference</a:t>
+            </a:r>
+            <a:r>
+              <a:rPr lang="en-CA" sz="2600" dirty="0"/>
+              <a:t>, by Graham Sellers, Addison-Wesley Professional, either 6th or 7th edition:</a:t>
+            </a:r>
+          </a:p>
+          <a:p>
+            <a:pPr lvl="1"/>
+            <a:r>
+              <a:rPr lang="en-CA" sz="2200" dirty="0"/>
+              <a:t>6th Edition (July 21 2013), ISBN-10: 0321902947, ISBN-13: 978-0321902948</a:t>
+            </a:r>
+          </a:p>
+          <a:p>
+            <a:pPr lvl="1"/>
+            <a:r>
+              <a:rPr lang="en-CA" sz="2200" dirty="0"/>
+              <a:t>7th Edition (July 21, 2015), ISBN-10: 0672337479, ISBN-13: 978-0672337475 (OpenGL 4.5)</a:t>
+            </a:r>
+          </a:p>
+          <a:p>
+            <a:r>
+              <a:rPr lang="en-CA" sz="2600" b="1" dirty="0"/>
+              <a:t>Anton's OpenGL 4 Tutorials</a:t>
+            </a:r>
+            <a:r>
+              <a:rPr lang="en-CA" sz="2600" dirty="0"/>
+              <a:t>: </a:t>
+            </a:r>
+            <a:r>
+              <a:rPr lang="en-CA" sz="2600" dirty="0">
+                <a:hlinkClick r:id="rId3"/>
+              </a:rPr>
+              <a:t>http://antongerdelan.net/opengl/</a:t>
+            </a:r>
+            <a:r>
+              <a:rPr lang="en-CA" sz="2600" dirty="0"/>
+              <a:t> (which is now an e-book – the cheapest one for sure!)</a:t>
+            </a:r>
+          </a:p>
+          <a:p>
+            <a:r>
+              <a:rPr lang="en-CA" sz="2600" dirty="0"/>
+              <a:t>OpenGL Programming Guide: The Official Guide to Learning OpenGL</a:t>
+            </a:r>
+          </a:p>
+          <a:p>
+            <a:pPr lvl="1"/>
+            <a:r>
+              <a:rPr lang="en-CA" sz="2200" dirty="0"/>
+              <a:t>8th Edition (Mar 20, 2013), ISBN-10: 0321773039, ISBN-13: 978-0321773036   (OpenGL 4.4)</a:t>
+            </a:r>
+          </a:p>
+          <a:p>
+            <a:pPr lvl="1"/>
+            <a:r>
+              <a:rPr lang="en-CA" sz="2200" dirty="0"/>
+              <a:t>9</a:t>
+            </a:r>
+            <a:r>
+              <a:rPr lang="en-CA" sz="2200" baseline="30000" dirty="0"/>
+              <a:t>th</a:t>
+            </a:r>
+            <a:r>
+              <a:rPr lang="en-CA" sz="2200" dirty="0"/>
+              <a:t> Edition (July 8, 2016), ISBN-10: 0134495497, ISBN-13: 978-0134495491 (OpenGL 4.5)</a:t>
+            </a:r>
+          </a:p>
+        </p:txBody>
+      </p:sp>
+      <p:sp>
+        <p:nvSpPr>
+          <p:cNvPr id="4" name="AutoShape 6"/>
+          <p:cNvSpPr>
+            <a:spLocks noChangeArrowheads="1"/>
+          </p:cNvSpPr>
+          <p:nvPr/>
+        </p:nvSpPr>
+        <p:spPr bwMode="auto">
+          <a:xfrm>
+            <a:off x="8534400" y="4800600"/>
+            <a:ext cx="609600" cy="342900"/>
+          </a:xfrm>
+          <a:prstGeom prst="rightArrow">
+            <a:avLst>
+              <a:gd name="adj1" fmla="val 50000"/>
+              <a:gd name="adj2" fmla="val 33333"/>
+            </a:avLst>
+          </a:prstGeom>
+          <a:noFill/>
+          <a:ln w="19050">
+            <a:solidFill>
+              <a:srgbClr val="969696"/>
+            </a:solidFill>
+            <a:miter lim="800000"/>
+            <a:headEnd/>
+            <a:tailEnd/>
+          </a:ln>
+        </p:spPr>
+        <p:txBody>
+          <a:bodyPr wrap="none" anchor="ctr"/>
+          <a:lstStyle/>
+          <a:p>
+            <a:endParaRPr lang="en-CA"/>
+          </a:p>
+        </p:txBody>
+      </p:sp>
+      <p:sp>
+        <p:nvSpPr>
+          <p:cNvPr id="16386" name="AutoShape 2" descr="data:image/jpeg;base64,/9j/4AAQSkZJRgABAQAAAQABAAD/2wBDAAoHBwgHBgoICAgLCgoLDhgQDg0NDh0VFhEYIx8lJCIfIiEmKzcvJik0KSEiMEExNDk7Pj4+JS5ESUM8SDc9Pjv/2wBDAQoLCw4NDhwQEBw7KCIoOzs7Ozs7Ozs7Ozs7Ozs7Ozs7Ozs7Ozs7Ozs7Ozs7Ozs7Ozs7Ozs7Ozs7Ozs7Ozs7Ozv/wAARCAFZAQQDASIAAhEBAxEB/8QAHAAAAQUBAQEAAAAAAAAAAAAABAABAgMFBgcI/8QAURAAAQMCBAIFBA8CCgoDAQAAAQACAwQRBRIhMQZBEyJRYXEUgZKxBxYjMjQ2U3N0kaGywdHwQkMVJCYzRFJUYqLCFyVVZHKTlLPS4TVjgvH/xAAbAQACAwEBAQAAAAAAAAAAAAAAAwECBAUGB//EAC8RAAICAQIDBwMFAQEBAAAAAAABAgMRBCESEzEFFTJRUqHhFGJxIjM0QUKRYSP/2gAMAwEAAhEDEQA/AOYxzHMXhx/EYosVrWMZVSta1tQ8BoDjYAXQPtgxr/bFf/1L/wA03EHxjxP6ZL98qOEYTV41iMVDRR55ZD5gO09i7CUVHLQjO5P2wY1/tiv/AOpf+aXtgxr/AGxX/wDUv/NatdDgHDtU6kdTuxerj0lc6Qsha7mAG6nxuicLfwtxBUMoKnDjhFRL1Yqinmc5mbkHB11RyjjPDsBiQ8QY0ZmA4vXEZhvUv/NekMq6kxtJqJdv65Xn+PcN1nDWLspKsZg4h0cjdntuu6j/AJtngF5bt+b/AEuG34O92SovPEEeV1Hy8nplOaup+Xk9MqnsSXl+ZZ6n/wBO7y6/JF3ldR8vJ6ZS8rqPl5fTKpSRzLPNg4Q8kX+V1Hy8nplLyuo+Xk9Mqm4SsVHMs82HBX5Is8rqPl5PTKXldR8vL6ZVR3sraamkq52wwtzPcbKYytk8KTKyVUVlpCFXU/Ly+mU/lVQf38vplEzxUmHyGJzfKJm6O1s0FRjqqUvHTUbMvawkELRiafC57/kz8cccShsUeVT/AC8nplS8pn+Xk9Mqyvghgmb0Di6N7Q4X3WnhFJR1tHNJJTDNENw46qYQtlNw4yJ21xgp8JjmqqPl5PTKXlVR8vJ6ZUZntc8lkYYOwG6tAg8mzX6/ikOVmccT/wCj0oYT4fYh5XUfLSemUjVVHy8nplVX7kxKpzbPU/8Ao3lw8kXeV1Hy8nplLyuo+Xk9Mqm4SRzbPU/+hy4eSLvK6j5eT0ymNXUfLyemVUm1U82z1P8A6Ry4eSLvK6j5eT0ymNXUfLy+mVVdIlTzbPUyOXDyRb5XUfLyemU4qqn5eT0yqE6nm2ep/wDQdcPJF3ldR8vL6ZS8rqPl5fTKamgdVVDIWAlzzbwRuLYUcOe2xJjcN+wpiVzjxpvAmU6YzUWllhWFSPkpXF73OOci7jfkElHB/gj/AJw+oJL1Wibeng35HnNWkr5Y8zxviD4x4n9Ml++V6F7GFI2l4ZxjGwAZmB7GHmMrM34j6l57xBb2x4n3Vk33yvQ/YlxGCowrEsCkcA+QukaDzBaGn1Bd+3PLRz49Ty+Z7nyue43LiSSosc5rgWmxBuCisWoJcLxOoopmFskLy0g/YhYWPmlbGxpc9xAaBzKdlcJV9T1/i2NmM+xrhmLTC9RCInZuZvZrvzWthFDh9XhMs5icwxtsSXX5brm+OK+PCOEcH4aa4GoyxunaOQA2859S6PAyfa3WW/q/gvM65JyWVtudTT5UHh/2C09fRxzZX0UZhJsb3LvG6txvDGUT45qfWGbVo3sVkeZdJjErYcLw+KT34LXEdwH/APFwauG2MlNdDq2p02RcP7AamniwumhD4myzyjN19m+ZShp2YnQTSMibHNCL3ZoHDssj+I55YugmiDDE5lsxaDqsVuMVjInRse1rHbgNAVrOXXLhfQpUrLYcS6/kOwClo66V0csJLmtvmzXH1IeWopKKpdFFTMmDXWLn8z3Dki+FD/HJvm/xWJPrM8nfMVVyUKItLcYoOV0otvGDZxalpX4ZBX00fRZ9C0bK/hqBraKpq/2miw7tFCr+KVOf7/4lS4VqGOZPRudq8EgHwsnJQ5626oQ3L6dryZz8ji+VzjqXG6TWPd71rneAVlXA6mqpIXixY4jVEYRPJHiMDGvLWueAR2rmctyu4X5nT48U8UfIGkEuUdIHgAWGYbLf4b+A1v8Aw/gh+KJXDEBE1xEeQdXkiOG//j64/wB38FuorVeocTDdNz06k11wc6d0rpjurHRPZCyY2DXk5e+y5cotts6ilFJJkLqN0klRIYPdJMn0QAkktE11YgSSWiYqyAdOLKNk4Uf2Rg3aWrw+LCnPMDfKW9XTme1NhtZRy00ja9ocWXcC4nXuWJdNdbFrJLGxieii879Tdwx7ZIZXMaGtMpsByFgkoYN8Ed84fUEl6bRPOng//DgatYvkjxziHTiHFD21k33yhsPxCqwusiraOZ0U0Trtc39ahb+OcNYnUY5XzRQtLH1UjmkvA3cSgDwpiw/ct/5gXZWu03DwuSM30t3VRNfEeK8G4kY1+OYZLHWNbbyqjcOt4tKApMZwfBZvKcMoZp6lusctW4WYe3KNz4lD+1TFvkWf8wJDhTFr36Fv/MCX9XpF0mS9Lf6QKorqrEcRNZWTOlmleC5zjfn6l7bw65jeHat0jS5oGoBtcWXkUfC2KiRrnQsABB/nAvV8NrKGkwiWkkncXSt1IZtpZcnX6imc1wSXRmyimyMGmv7A2S0EUgkbHM8jUMcQAPPzVVZWS1s5mlNzyA2AVlJSw1FeyETXY472sSU1SI4TJC+mEcjXdU3O3evOS45RfkdmPBGS/thdLjTWUXkdZD08Q0FtwhZ6ihAPk1M4Ej3z3Xt5kRWYc9xpzBE1okiDt7Ak+KB8km6cwZCHt3G1kWStS4WskVwpb4k8BuE4rFhjnPELnvcLEl1h6kHNJDLOXsjLWk3LS7XzaJpqaWAML2iz/ekG4P1I3DaF0lW2OdjLEatc4XHmuqJ2zSg0Xaqg3Yn1JzYvBLhraA0zgxpuD0mt/qWXFK6GUSROLXNNwQUSae9PPIIXHI6wffQa9igMPqcrXmPKx+ziQAi3myafkFXJimvMKnxWOtY0VtPmkbs9hsfOo0tXRUk7Z2Qyve03Ac4AXQr6SeKcQOjOc6gDW6mcPqGxulszK02cc40KlWW5y1uiHXSlhS2ZLEa5+I1XTyNDTa1gjcOxmHD4JIm0zndIOsS/f7FlwgGZgIBBdrdE4rBFT1hihYGtaBsd1ELLFm3O5addbxV/QzpqEuzeTSeHSaepNXVrKromxRdEyJuUNvdRhoppmNcwAB5s27gLnuTRUNTM97I4yXM98OxRJ2yTSXUlRpjLOd0DlJEvoZ2QGbKCwGxLSDZKOgqJQzKADJ70FwBd4JCpnnGB7uh1yDWTq+ShnjZI8hpbHbMWuBsovppmU7Z3N9zcbA35odU11RKurfRlKSJdQTMje85T0er2hwuE0VFNKGEBozmzLutmPcpVM89COdXjOQdJEuoJxK6M5bsF3HMLN8SqpqeSDKX2LXi4c03BUuuSWWgVsJPCZWnTJJTGkkySZVJNvBvgb/nD6gklgvwN/wA4fUEl7PQ/xofg8lrP5E/yZFWP43N8671qm2qvqx/G5vnHetUleRtb5kvyz1NaXAvwNZMnTXVE2XwhJXSAT6KMvJJbBFJNJaI9douFqdKazCJTWN90hI6J7hYuPYsiPNnHRkh3KyvdDVv1c2Q21Fzt+gtlE3FPYxaiCk1l4DcUz56IXcQImgaK6oozNilQfdLMiDsrd36bLIzTOZnzEtad7p43VEj+o57nAaEONwEznb7oVyNtpG3dkVNhz5oxGxshLh/VHeq6ammZjxe5rizMXBw2IO2qyGRzTNuzM4A667J421EgLW5yI9bA7K7vy1sUWn4U9zQijeMLxAFjgc7eXeoVuf8AgmhaWkWzXFu9B5akOMYz3zZbX0uqi950LnG3IlUd22MF40ZfU3JHyMxLD3NZdxia3raeKprYZqKmqImxPMcj7l5AsEBSVZgmzSlz2lpG+re8KxlU2nilYyV8vSNy2cLAd6YrYSi87ZFcmUZJdcA1OC6dgAJOYaALRxinllxUhkbiHBtjbRZYJabg2I5hS6WT5R3pFY4WRUXFo3TrlKalE2KeiMD6V7W9Lmfcvv1Wa9ilG17K7ESGnWN2WyxM7gLZjbe1+aQkcNnEX313T/qIrojM9LNtts0qJjzhFaLO3bbTxRccM09NR1YjMhibo1hGttr9iwg94AAcbc9UdLVxTSxzF8kbmNAytF9uzVMpvg1llLtPJPb+y2Bsk1PXRZD0zrOyefVW+Su/geCJ5yOM/Wv+yD2rMqal1RUvntlLjyKpJJvcnVU+ogn0yWWmm11wb0NM6F1bE2MAdGQ1zjdz++6jT08tRQ0kojzuhccoYRcga6371hhzr3zG9rXujHVMVQ2HO58Tom5bNFwe8dibXqIMXZpppbbh0ckk7a6J7GtqZHB4a4b9yzqp9QI2RzMDGtJyiwFu1RrKs1VT0oBblADdddFQXOcbuJJ7SkXXJ/pRoooafE0MnTJ1iZuH5pin5plUk28F+Bv+cPqCSWC/A3/OH1BJez0P8aH4PJaz+RP8mTVn+NzfOO9aoKuq/hc3zrvWqF5C1f8A0l+T1NfgX4EkmS5XVEMHSTXSuUY/sgkz34ubDt7Fp+XQeUzyXuDHkj08ywq6ujw+ldUTAljd8o1WT7csNuepUegPzXQ01F8lmuOTDqJVN4m8HbvraF0uYNbl6Qut0fLLYDzlVitpWwueNJnxFpsz9orjDxlhw/d1HoD80x4yw75Oo9AfmtX02rf+DNxaZf7Oup5oY6J0RczO94JzA6AfiiYayhhhcwE2dkuMvIbriPbnh3ydR6I/NMOMsO+SqPRH5ojpdWukAlPTP/Z3Jr6clgc7qBz3FmTcm9kzKyhY8dS7QWkDLtYa/WVxHtzw4fuqj0R+ab26Yef3VR6I/NS9NrPQQp6b1nW1tRHO2IRtDcjbOsLak3Qi50cZYeTpFUeiPzS9ueHn91UeiPzSJ9naqbzwmmGr08Fw8R0SS50cZUG/RT+iPzS9uVB8lP8AUPzVO69V6S/1tHqOiS0XPe3KgP7mf6h+ab25UF/5mf6h+anuzU+kj66j1HRpFc6eMqEfuJ/qH5phxnQkfzE/1D80d2ar0h9dR6jo7pLnfblRfIT/AOH80vblRW/mJ9e4I7s1XpD66j1HRJhqudPGdFt0E31BIcZ0Q/o832IXZmq9IfXUeo6NJc37c6Mn4PN9if250d7dBN9it3ZqvSH11HqOjTrmzxlRj+jzfYn9udJ/ZpvsUPszVekn66j1HR2Ssuc9ulJ/ZpvrCY8aUn9nl+sKO69T6Q+uo9R3+C/A3/OH1BJVcOTipwoTtBAkdmAPgEl6HRxcdPFM89q2nfJo84xvjueixuvphRMcIaqRgdn3s4i+yAHsh1B/oEfplYPE+vFWL/T5/wDuOWaI+ZIA8VZ6Ol7uKJWsuSwmdkPZBqDcmhiAH98pm+yDUvd8Bi9MrjX62AsnjGtzZR9FR6Q+tv8AUdn7fqmxPkUPplI8fVQbm8hi9MrjtSbdnerADl5b6KPoqPSH1t3mdHifF9TiNEaZ1JEwPtqHHTVYXlEg/ZaqCLuvcKJve2m61VJUrENjNZZKx5kEmpkOtmqIqn3sQ1UuboNR9aYsNha1z3p/On5i8IJ8okt+ynE79+qhw0suHaKTW94+tHOn5hhBIleQdWhTaXEbtQ4bpuPrVrG3F7jdRzp+YYRe1pJ98FMQ3/aVbG2B1CIY21rkao50/MMIdlKLDrlWtoGk36Qp2NJOhFlewC46wRzp+YYRFmGxneVw8CFazBorfzr1axEx7DVHOn5k4QM3AYXHWaT7FezhumNj08v+H8kZH480TGLcwjnT8wwgJvC1I4j3eb6x+SIZwfQuteef6x+S0YraIyHRHOn5hwoy2cD4dJvUVH1j8kVF7HmFuIvUVXpN/JbMJ2WjTnZHNn5hhGFF7GeDvOtTV+ZzfyR8HsT4E8i9VW+Z7fyXQQFa9KdQjmz8wwjkm+w/gH9prvTb/wCKl/of4f8A7TXem3/xXetNwE6jmT8wwjgf9D/D9vhFb/zG/wDivOPZA4co+GMcjoqJ8r43Qh95SCbkns8F9CrxH2ZPjXB9Fb6ym1Tk202GNzqeD/i/D5vuhJLg74vQ+b7oSWGrwIfd42eJ8StHtqxcu/t89u/rlZZOZy1eJiRxVi/P+PT/AHysq/MBPEET28lKPVw0TEm1rJ4z1roAmAbkqTddzYAJOJA23SLzroLeCgBgetYAbq+SkkDmhnXLtersPOiqeiYGB7wHne3JX5iTo1rbdgQQASUE4aXaG3IJUTAZdR70c1qMlJOUgX8FU8Mje5waBrclAGRIT0rr9t07bXF07nF0rtBYknZJhPYEATBREYJFhzVbSb6WItqSFp4fD0gzEfYhkoto6HPHneSG35blEuogwHJmPbdxKKpeqzozYZe7cIrLfbQ9oUAZkUEUcl5hpfS+yiXB0jiBYE6AI6qjBp3gjYXuVmte7Q87IAJbuiI9whmOciY3G/8A6QSFRkIqNCMdoiYyoANiKNiOqAjJsjISRa6ANGErQgOoWbCdEfAdQgDWpzstWldqsenOy1KXfdAG1GbtCkqacXbdXWUgI7LxL2Yx/KuD6K37xXtp2XiXsxgniqn+it+8U6rxEM6jg/4vQ+b7oSTcHfF2DzfdCSyVeBD7v3GeKcSH+VWMDb+PT8v/ALCsxxIGh0PctPiY/wAqsXF/6dP/ANwrM1I322TxBAnvTsOtkhrbUqUfvtHbKALHEi1nbdqIpsrg4izpALtBCp0I3ub9ikHFtnBxB8EAbDdIG6207FFrspNyTfsCGp8RAAZNmP8AeAVkmIsAOQFx8LBRkC8Nu65NuwWQuIVALWxMcCSdSAqJauSUm7iB2NCGc5xcTckcrBACzWNy66k03IN9B3Ks5iDqVaw6AXI07FJBMO0y337lt4XKzo8ua5HcsaB0fSl0jnDTTTmioKjo8pEruqdyNSoJOka3UG5vvsrOme0EhubwuEBSVzZY9Xm6IdVMAvc2UEkK2WR0NnHK07tHNBRk6Xdr4J6ipM7g1pOQc1Ft82hN1JARGdb5vsRMbjff7EPDckC5V9QySmGWTM0k7qkppF1FsKabjTdWRTEENks0t3sgXyFkYDSbX7FZEXTNuDYHdJcpdRiS6B5xBkbuq0uHM7Ik4tEyEuj90eB7xhBP5LIDCTa+wN1CjqBheIx5j7lLo64271HMecFlDbKR09BirKiRsbmljnaW7D2LegNiLrnKPoZKq0cZz5y5z+wAWH4rfhOoKZVJy6lLUk9jVp3m9lqUpOnJY9O7W606Zx02TdhRu0rjaxRKBpZNgbI0bKcgOvEfZkP8q6f6K37xXty8Q9mT41U/0Vv3nJ1XVkM6jg7Xh2DzeoJJcG/F2DzeoJLJV4EaL/3GeJ8S5vbXi5H9un/7hWZd2ov4rS4nJ9tWL/Tp/vlZmtr3TzOOcwtunZe9gPFNfZJriHaFQBc27RfUJiXE7p3E5AL7hM3QIIJE21vqnJOlzooHTTtUgLm5Ng1ACJNr3solxAsL6DZImwAsnAvcoJEwGxJOg1Th2unYkSBzFkwAOt0EE26vsrRe3gVVYB26tBBbrzQBcx7stgTdXNe8n35Pbqh2ciNlcw2A8UAEMdYAA81ex1ze6HjO3irmboJCY3EKyV/Svgie46A7nQKlh0U3Rl4Dm2zt2uk2w4o7Da58LNF1M1lKBmzEbp6cxgFti0lD09W80/RSDKRvfmpMlABDRncdsjSsqjPCQ/MOpJhLJSDqCE1VJE2Rj+jErgMsbCd3JNpqiUi0du3MUbQ4S2OpbPKQ5zdhyCY6XJ7i1ZjobWGw9BTtzavdq89pWtCdlmwlHwlakklhCW2+pqU520WpTOHYsiA7LTpzspINulsbaBaA2WXSu2Wmw3Ckgc7LxL2ZB/Kmn+it+85e2rxP2ZPjTT/RW/eKbV1BnTcG/F2HzfdCSXBvxdh833QkslXgRov/AHGeLcTge2jFjY6V0/8A3CsgnSy2OI2GTivFmMBLjXT/APcKjS4U0APm1PZyWyuqVj2MkpqPUyhG92jWknuCuZSVBsRC8jwXRRthhbaOMfUnbPI112m3mW5aJf6Zneo8kc+6CRp68TwB2hQsLnqnQLsqfFQ1zWVFPDLEdHXYLqOMcOUlRB5Zhz2AO1yX1HclWaNpfpZMb03uckQA25BJ23TtFgbjW1080L6eTJJGWm/PmrI6d0o0bYH9olY+XLODRxLGQcAe+c3XxRUVG+SzmtIvzJWrh+BmSxazQftu1W/S4NTx6yAyO79AlW3007Te4JTn0ORGFlwAdJ9QU/4IbbqSHzhdlWeQUETS6CMlxsBb60T/AAVQ1MQc2PLmFwW6Ja7S0yX6ovBaWmuS4snn1Rh80NjkzDmW6qvKBlBHLa67StwiWlaZGe6Rjc8x4rDq8Ojm67AGv+wroRrrvjx0PKEcxweJoyWBx5aXVzGutsqnxuilyOYWkcu1TbcDnqszTTwx2U+gQwgaditYRa91S3caK1hHZdQSExkHYIqPbQd26FiIPLVEscOxVAKY0adVExWA2QkZ02uiI3Ackbkhke+2vii4jysgY3A8kZE4aaBG4BrCGi5ICJpaqCSQxMla54F8oK53Gq+ngoyx84Y5w0aDqVlYVV4vKT/BtM9z3Ns+V4v9XIJcrOHqSlk9LgkaLXIWpTvvqDyXlVRQ4qbvr62V5/qB1gPqWtw5xRJh7zQV8hdEdI5XbsPYe5VjqISlhEuLXU7ut4qocKcI3l0kpF8jBcrosHrJq6iZUTQ9CX6hl7kDv715XS5KnEJqmWz81XHECezdeu0jWsha1osBorVzcm//AAhrCL14n7Mnxqp/orfvFe2FeKezL8aKY/7q37xWurqVZ0vBvxdg/XIJJuDPi5B+uQSWSrwI0X/uM8vxambHxHish986tmP+Mqi9tOSOxwWx/Efpcv3ygCV6SqKjBYOLNtyYxOp70rEapJG6Yyo1+StZK5osHEDuVKWayq3gnBa5/SAZwHW7dVOkibPOGnRu5QheRdF4e/IXkHVYNbZwVNofVDMkma0tTJTsHQ0/SMHIGyHHEJabGm17M3/pWRTa96AxaSAytaxoDwLucF5NJTliSyd6hRb4WiNXXSVtR0jhYDRrb6BbOF43BDSMhnzhzdLgXFlzrWute2m10fhtJFW1bYZHFtwdQN1NlcJQw+iOjKEHDB1dPidFUNs2dmvJ2iysXoW0sgliHub9uwFaVLhVHT2ywhx7X6qzF4mvwyTTVliO5R2bquTqYxh0ZxdXXCUG0cjUU7J2kOGvbzCzXUkrHhoZ5wtm11G+Wy9vZp4279DixtlAqosOiyl9S/I1o1sLkppGU97MYQO8qZcbGx3CouU1UVpYwVdkm+o/R296bhWMta6qzG6uYdttVz9TplFcUDVVdl8LCIzoESwhUR9nVV7HWPJcw0hEbgNzYIKvxUxtMcJyvIHWRmTMwtuNQs3EJIxQdBUxkSxH3KVg98L+9P5pdjklsWRbhVBTSTNllZ0rydS83XpuCU0bqQMZG1rbWsBbkvNsLfq3usvTOGJWdHYkXt9n6suDqJSb3ZoiZ2OYOWtc7LouFxKgcSWAanQL2HGH0zaNxkc1otzXlGO10AlIiOZ19Lb3UUOTlsDxjcNwGmOehw2Nxkl6cTSu7LL2WlPVAK4LgnBRQUTaiZt6iXrOJ3Hcu7pSu9TDhjv1M8nlhS8U9mX4zUp/3Zv3iva14r7Mnxlpfow9ZWyrqVZ0fBnxcg/XIJJ+DPi5B+uQSWSrwI0X/uM82x0f6/xH6XL98rPtqtLHG/6+xG5/pcv3ygct7FemrX6UcSXVkLKJCuyqBGqvggqIsoOOqtIVbwLbbJMy0SlzzZWUc+SbKdA4Id538FXfW6wWx44tM0ReGmbhkytJAJPIBRpKFr5ekqDncTe19EBBWljQJG37CN1oQV0F9X28RZcGzT2w2SOhC5LozoIooZIhE6NuQi2W1ggXYe/D6yKphu6EO17WqdPX0waPd2jxRgxajY2xlzjsaLrFGnUZwosfDUqPVmxEM7rDVD8QO6GjELSC5+9uQWezH7vDaePL/ed+AWnPTiqw583vnAXOt10ezex5qxW27YOfqNUscMTkwbm1kzx1FKTR7gmOy9ljBzAcHqqFjcKQ537U7hbZAFfepsNiByTWTHcKk1lNFk8PIdHY26yujsOd0LE82ARMbivOTTjJo6cXsguIC24VeI0nlNKWt1dZSjd4IqM9qr1LHPUtW6jdklaWlp3IWzS8WGnaGwuJdsLaot1HBOLPjaVZT4LRtcHCMXWSekhN5LqbRnTYti2MOygvsebvyW1gPCrWTtqq0mSQG7Q7YLRpKaGEDJGB5lr05AsmV0Qr6FXJs1qUBgAGwFls0p2WJTkG2q16V4Wgg0V4r7Mvxlpfow9ZXtI2Xi3syke2Wk+jD1lOq6kM6Pgv4twfrkEkuC/i3B+uQSWSrwI0X/uM83xtw/h/Ee6rl++UGHJYxP8AylxVp5Vsw/xlVNdzXoqLMxRx7I7hF+5RcNlEPN05cT4LTlCsESFXILBXX5qt4zApU1ksgKQdQ9qCEhzEEaXWhIwkEBAyxFhJ/Z/Fc+1Y3Rpg0+pc0h1rKyM9m3NAxy5bAoxjhlNjruVEGmDTQbCr2dqHgOnmV4OnmW6tLBnkEwusQulwqrc6kmjcbjKVykbyAe1bGHz9HG4X3C0Ji2gKbSV3io6kKUpBldqq7qQKi2z9FIgX2Sd78W2Ujugkhl3UXC2qsJ0Vch6qh7ICyKZoFs2o5I2NwdqLkLJgJLi6+6NZUGIaG5715yzebOnDwo0mHLYE2uiozrusTpelcNSTfkd0dTPqc18hLB3qjiy2TXjJ0RsJ2WfFI2wOYi/IoyOVrRmc4ADmVXDZOTShOoWhA4DeyxJsQp6CAzVEoY0fb4LBk4zq53PFNS5YNg4nrFMhXKfQhySO4rMdpsOAaAZ53e9iZufFGcP8Svr619DV0hpp26gEmxHnXlhxOQVHTiRzJL7P98fOuwwSvE+O0EhF5ZG5TYcgU7lpfpwVzk9TYbsXjXsyj+UlIf8Adh94r2WK2QeC8a9mX4x0f0YfeKrT4izOi4L+LcH65BJLgv4twfrkElkq8CNF/wC4zx3HpCzirFzy8um++Uop7gXKhxHb2z4sO2umP+MoKKYsda+i6NNjic+yOTYDgU4PJBsmvfVWibmTZb42pozuIU3dK1ySqmzNS6QHnuruawQojHS/ahaiPO0juV0krWAuJQb6nPcNafFZbGmhqTTBspADjpYfWrIpCBY3USS7K0c1CQOBIOhGqyJtboc9zWp3g63+pE30KyqSXtOy0I5c42W+qzYzyiXA2CKimyjdCZrKdyALLTGQpoIzZie9Im9lU1xJA7E5dom5RXBK4uFI6nRUB9neCtz8+1CeSRjzVUx6p7lNz9ygppsz8o5LPqLVCDL1xyyyNxaQQEQDc2cbd9kFG5x2V2crhbt5Z0FjBoMcxjdbO5hacMrXUedpsR61gxlxcG237Ua2+bLG6wHvgTpdDWSQ0V3VJkYXAb2Q9RiTZnx9e0YsAOzv8UDiEoEVmmztkLR0755AGg5RsSm0QbllFJYwHVHTYnVNbmc4Ws0H9kLboMPkaGU7YgWk7OFh4qrDmRUbg4guLdbg7rWqMfnkiEcbGMAFiQ3ddWMeHoJzkxsZoGipMZLXW0u3YLQ4EmbBxNBFUkuGQthJ/ZPYhWU0tS45WlxPNXYLFk4qoIxo9st3X7lW1R4WyY9T26Bwybrx32ZteIaO2v8AF/8AMV6/SkFg05LyH2ZtOIKP6N/mK5lPiND/AKOg4L+LcH65BJNwV8WoP1yCSy1+Eff+4zxviQfynxbvr5/vlZobY3JK0+IdeKsWH+/T/fKzLCx71qj0Mj6ljZC0gX8VYJ7nZDkXHqUhraxTFJoq1kIE5PO5U3PlcOrpfmUOzQ3tp2q8SXDRvZXUmyrWCMo9zdrcnmqLFrueyIvm07VBwu6wCJLyBEIt2ErVbhzK2lke12SSNt2/3u5ZIBBbbQErdw82ZlHYm6eKlmLKWNrdGILxmxFrckTTS31B0UcQAfWSWAGVDxuLQB2JXgngv4o5NVjrgXV19EFE7qgX33RTTmGq2QkIki1hAKZz7MKYGylTvY6br6i1h4psmUS3M5tW4TOubtJ0RTam+525oGrpehqXMG17t8FGJr7nraLBz3BtM0utPdBslRdpy9iGaddd0wBDDruptYSPMstlrmxsIcKLWOyhXggnbzodjCdir8tst7fWljC9rrkuvrbRTY4NuQHE3VQBIOoRdNEbXc9rQdrndXSctkQ3gx6+Z3TWOovddFg7qWXDZXF2WRti0clmVmE1E8pdDF0gte7E9DQ1VK0ukbZvq8Vt00XB7i5tM6CljM0jYwNXm11ZVweTSdER1gNSnwjFqeg6z6cSyNN2uzKjFMWFVUPqJMrM2zRyW3O4vbAQ3ExTYfJCOqSb3R3A9JJX40cSlHViGWPTc9q5mljnxaqEbGno7/WvU+HcOZh1I1gFj4LDqbljhQyEWddSmwsvIvZn+MNH9H/zFes0p0C8m9mb4wUf0b/MVlqf6hjOg4J+LUH65BJLgn4tQfrkEllr8Jou8bPG+Jbe2fFiN/LpvvlZwIOvJaPEoHtnxa7h8On++VlsBaDdaIsyyRMkc9lJug8yhYONrqexAuOxMKjk9UDkpRg2GXkoP7ueiLp4rxjwV4LLKyeCtpLRfsTtuSNNVc6IgWspMiOcJ/CLyDvj6h0Wrh/82TzsgZW7tGiIw6ZjGZXutyuUyrEZFZ7oHkZed7iN3IeoYGWAIF0VNK1kzySLAoSaYSZQBoNtNUm3BeGS+AAt312RTHC1roGI5eaLYdNVetkSRY5wY0knYXQUNS5ktnX1KlVS6hgttqqGgONrjVKtuansXhWnHc0p2NqYQ5gu9m3eFntIzWyjRTgmkgfvdo7EV0MdWM0RDX7kXsomlb+pdSYtw2YKLBp0B1UrggjTbU2SLcrrG2mhTt5+91Cx4HFkZFvejQWVodvoL2VbSLGxarGu3PVUEifNlaLAX5KMc1QXaAmysYA52w8CFt0VPHG0Etbfmhy4QxkzY8YxGlkJgJjLm5XWG4TsrMRqI3NDAARbRu66CGmgkeSWNWhT0sLNmNtzQtTOPQngRxsVHiLnZWh2q1aThXEJ2dLIXEt1suvgpwQMrW/UtON4bFobFUlqrGCrQDgeGUtLE18QuS0E3Gt109MdBYrKijbG/qixdqVo0/LdTnbJJt0pOmpXlPsyC+P0X0f/ADFepUptYWJXlvsxOvj9Hp/RvxKfT1Ks6Hgn4tQfrkEkuCfi1B4/gElmr8I+7xs8b4n+M2KfT5/vlZ1uvfuWjxMSeKMU1/p0/wB8rOjN32O4T11MzCBTOLL6DRVublfbmFrQtHQtuL6LNqj/ABl3LktllfDFMRGWXgpvd4FgtemZ7mPBZDGgvB5k6LdhbaNtuxX0yyytrwiD49LpNYNFY9twk0WIWxx3E5M+ukyODW7ndUsq5Y4jEA0tcb6jUIippJZqlzgQBss9zXNcWu3aVz7XKMsmiOGiT3Fzus5Ra43TE3fryS0CS3kuFNGXzq9rjbMTtqhWkB453VkjyI7DW5Tk8RyVayykvL5ie1OzNcGygHG5F7KxhLQNdVjbzuPWxJjztpYaKynlEDycrX5hYg7KDXhzeV/BNc2Hb4KYycegNJ9S0vLrmwCYH7VBpJ0TPfY9gsqgXtN+qrGWNygmTFvO4REcosbggowSFxGxaStunkaNzusFkjerqVq08FXK33KmmffYhhVZLIZNume1xDWAud2AXWg1krG9eJzB/eFkFhnD+MVFx5PNTtcLdK45bI+owOroJA3yzyghmrGlzRbt1Oqo4bE5CYqxsbbXtYbqEeIyHqho99qT9izZhJCWtcx0fYS0jVHgRRQkk2cQCCUvhBs3KWUyNBJubalalOdli0GkTSDutimOydFbAbFKdF5f7MH/AM5RfR/8xXptM/bXdeZey6b45Qnsgv8A4lop6kM6LgoW4ag8fwCSbgk5uGoCe38AkstfhHW+NnjnEg/lPip5eXTn/GVnxi0hLhutPiUW4kxRwJt5dP8AX0hWYLlx1ub6rRHqZpdDbj1iFhyWXVa1Ug5grTgPuLfBZdV8Ilt2roX+BGavxFcYPTDsW8wXYLdiwoATM0d66GEHKFbSIi4g4aBOBYgJ3ixSA7exbX1EFehJKyawBtU761pxOzMJ8UBiDAJ2v5ELFqN4Dq/EBAAuN1LI7cNJHbZSA5LVw05ogLbXWaqvjlgdOXCjPggmkdox1+22iMr6boaOMD3wOq1G2A8UPXtLqV5G4C2S06jWxKszJGARYetTbc6apHQG197p43Ovq7ULjm0TdGWATi5A7k7bl2+iVnXAv3oAgSWu5qDg7Pzsrz1xY9qi9paQVIBmFYMcREs81Q2npISA95GYknYNHNGOi4XhaW9PiEp7QGN/NEcFVFI6vdh9e4CKpBbmPIkWBWLieGz4ViU9HUxlr4nZdeY5EfYqqW5ODveAcEwfFcdjqaGOqLaTrOMzha57LBetywwQkZWj3pvlbv3rkvYsw2Oj4ZZLmaJZnZjcahdnWm9MXZrnlbl/6VlLchoxYm9JP0bsxa11hYaFXGmYa0uMRN2b8k1Gx2cyAgE3N+QQmI4jJR4o61IHsjZrewc8/wB26bKUUtyuHnY1aajg6EtMQuD/AFQT5u1B8SYRBWYZma1jHR2uQ2xtdEcPYg3EaJ8zGGIZj1XNsRz1HLRaUpzxPaXixaRci/JKm01sWSa6nCwN6MBuwAsEfLUGioHVDWB8pNo2H9oqDaMuqX5Seja/KTbW/h+KhPUMqMThoWtDo6YZy4a6+KXl4L/2G4PhrYXeUVTzNUu1LnG4b3NHYuE9lw/65otf3H+Zej0xF15t7LJH8MUXzB9afT1Ks6bgj4sweP4BJNwP8WYPH8Aks1fhHW+NnkXEjQ7iXFASR/HpvvlZgGh8bLpuIMOkdjuIuDCc9ZKb/wD7Kw6mmlhDrxm3bZOhZFyEyg0gynI6BtuxZ1XYVUgPI6IujkAhAcQLHmhawNdVOIN9lvskpVoyRWJMhSj3VpPaunpoyYQVzcRDZ2DkCulhnbFA1lr6LRpOgu7qVVDLPKrddsZ7momqcDYaIWXM6Bwbq4iwstVjSTYqKy0gGjfeEpq5t4Wu5tKphMlO1zXxuBvpopvqMzCwsOo1XN50HBps08uSl0AL+6fYtPCiRmBWc0bHv+pGUD8s+XkQqUSxYmXmsxNga2UpYTNCYha7xbVRYbkXU81pB4rqWvNbx5GStfrSKPabip2ENuXXTt4MxUcoAf8AjXeQHNAx3a0K22i+eWdpWxk0ezr7OqcUzgW8HYqAb9Df/jUvafieb9z6a7yyVlTvO0v3bUcE7g/Em6jordz0LPw3iELDnY0+BXo9h2JnRteLFoIUx7UszuVl2bW1seTOo6imkuW5XX0IK34sYpMZoWUeOsd0sQyxVkfvmjsPaF09dgkFS0lrbOK5mv4emhzZGnKF0adfCzrszm3aGdfToei8N8RxYbhcML+kEeXqHIHN+zdaOJcaUzqM5Y2lzbWDwW38NCvIY56qlYInZhbYjcKTKyaTPEZ3C2rdL3WxTb6GRxx1PR6bjSnpix0kEZcbAgvu4ADUgEaqdBXw41if8KSTSAGXKBmLWtABt1b9nLvXm0MQqwBLOxjr2BlJaB3nQrRkkmw+gfA3E6d8bHZwIZM2vjb8UycJSjgomkz0SDHqTBMRqYnBmR7nnM03O/K23nPJFjjSj6DLdxfzyRXse/XXzLyPyiR8OZ0pY52o0vfzovDqWqrZQwSOdGBqb2AWWU3TH9Q6MeZLETpa/GsQnqHeQiQNnc6+Y3aCAN+z60dgobh8JM73SzyHNI63Ps8ENTU7KaBsTNgrVxrO0rOL9PQ7VXZ0OHMzeixumZu1/mXGceU1RxBiFNNQxXbHEWHO4DW61SolEO1bovJd9nVNGnwdBJTYBHDKAHsdYgHuCSLwL4E/5w+oJLuaWbnTGT/s4upio3SijIraGB9TM4xjMZnEnzrOqsGpp2ZSwA9q2qn+el+dd60M4C681ZbOM20z0cKYSgso5KfhGPNdlvqWDi/DlXRObKyJz47aka2XpBTZQn09pWwazuhFnZ1UltsePs0mbvodbrbY7qjrDZdnX4Bh1e7PNTgP/rs6p+xCt4Tw4WBMzgNrvXd0/bdUVumce7sixvZnNSPuwElHYHCKnEY2aOa0FxC3ouFcOPvYJHgdrnH1I2lwykoLinp2xE6Hcn7UavtuFlTjBdSdP2TKFilJ9AGq4fpagkhtiUBJwnETdq6a2ninawkEhpsN+5ebhq7k8JncnpaXu0cJV8F1QcXUr2EH9lxtZZ0uB4pRTtkkpXlo5sGYfYvTAw5rW17E7mFps5pB7CFuq7Wug8tZMdnZlUuh56yOpcbNppif+Aq5lBiD5BlopbHmW2XemJ4bcscBvso2t5uxbJ9v3YwoiIdj15zxFFNG5lNE14s4NFwrgEsp3UgvOTk5ycjtwSjFIZJTEcjm5msJHaAk2N7rWYTfsCOFkuSIWTWUnMc0jM0i4uL805jeHAOaQTsLbqMMOJEbKL42uFnC6mRa4IsQlbVG6J2a3M+fCaebXJ9iCk4cgebgWK3bG9hv2KZie0kFhuN9E6Gotj0ZnnRU+qObfw6XgNdI9zQLAE6AJm8NMAADiO8FdDbuCcjwTfr78dRf0VPkYkfD1KHh0jS8jtK1IaeOBgZGwNHYArvNZMs87p2eJj69PXDoiKSdMkmgRTc06SAwbmB/An/OH1BJPgnwN/zh9QSXr9F/Hh+Dyes/kS/IFUgdLN8471oV+6MqR15tP3p9aEfuvMX7TZ6ajeCK7JrWT80QIac290tfv2SowbWwyUuHqDJtUQ+KJrmhslwTrqnbDE4XMgZ3XurcuRTmIsoALThwOXIPe+PJFNhZNUPe/I5jnWB7rboNsEOYXmBHPl+Pcn6CEaicH9bLTGWEkzLKGXlMuhihLYmOjAzRuLib3BF7KYYyOOVsbQWOhGV3MnS/2oYwQkn3cafrtTCKPM4GUWsLO/RRx4fQq689WKoaG1nV0GhGqetaTUzSbtDrbp42RxyuDn3sNOV+1O6CA5nCqBuDY23VGsxZfOJIJJZ5MGZvdDAAcx0IvrbvVbo4A+QOjaWtcOjsffKmNkDrF0gBIuR2FTFPS5jmqQRryTeJvqhXAo5w2TlbG2OdrA05g0t0sQNUIwxCFzXMJkJ6rr7K3yanJ0qc3ZZut/160z6Zkc5YX3aGk38yXPLeRsMJbthFA5raVt/lgdTa2m6kwNEkThy6QF3boQFR0FLkt02uawPdqoCOn6Qgy3aW3Duwq6k0sC3BNtj1liKe3KIA/WfzV0jM9bE42LWtZc3+tUCOn8oc0v8AcuRB7lIQ0xP8+RzsBoqpt5ZfCSSLJmRtGaNrT1yJL7gclN8MRmysEeW5LXEixFtvHxVIp6UE3qDpbW1gU5ipesOlNj70+fZWzj+ijWf7GqmQsqDkPYWhouO/XkiqtsU046J7GWcM4cdD3oSCKAseJXhrv2TdTbDRhwzTlw7hpuoi3vt1CUem72LnQwseDljcejdmGmh1tsoCOBzM1mCQxAgaAXvr3bKvoaS9zPcG/mP6Kg5lMJMrXggMNiTzVs4/pEKL82Dy5ekdlGUX2veyhujBFS5tZBYjlyOiYw0t9JzbwWZ1tvJrVqWwGU1kaYKP5Y6DlzVdSyG94XAjmLqjraWS0bE3gGCeycJJQ428F+Bu+cPqCSWDfA3fOH1BJew0X8eH4PJ6z+RP8g1QNZT/APafWgnDVdMksVnZXG88ft8m2vtPgWOD3+DlrJbLqUkvuj7/AG+Rj7Wz/j3+DlbJ9F1KSO5/v9vkjvb7Pf4OWS5LqUkd0ff7fId6/Z7/AActZSHMLp0lPdH3+3yR3r9nv8HMIwvo3k3YRvay20lePZbiscft8lJdpKW/B7/Bhz+ShjmRC5/ZP1JxJRlgDmOvpcju7FtpK3dv3e3yU+vXp9/gwi6iNzld3C1uX5qkiASu3LLGwtsV0aSh9mN/79vkldoJf59/g51xpsrsrTc3A/BWtmpQBeI30ubb6H/0t1JHdr9ft8g+0E/8e/wYE0lM4ExscCTpfkpdNTOZrDr9h0/P1rdSQuzGv9+3yHeEfR7/AAYpnpLW6JxsOz/2qpHUzmO6NhDr6Fb6SH2Y3/v2+QXaCTzw+/wcyd0l0ySV3R9/t8ju9fs9/g5i2iVl06SO6Pv9vkO9fs9/g5dJdQkjuf7/AG+SO9fs9/g5a101l1SSjuf7/b5J72+z3+DlbJWXVJI7m+/2+Se9vs9/gz8G+CO+cPqCS0El2KKuVWoZzg5N1nNsc8Yyf//Z"/>
+          <p:cNvSpPr>
+            <a:spLocks noChangeAspect="1" noChangeArrowheads="1"/>
+          </p:cNvSpPr>
+          <p:nvPr/>
+        </p:nvSpPr>
+        <p:spPr bwMode="auto">
+          <a:xfrm>
+            <a:off x="155575" y="-136525"/>
+            <a:ext cx="298450" cy="298450"/>
+          </a:xfrm>
+          <a:prstGeom prst="rect">
+            <a:avLst/>
+          </a:prstGeom>
+          <a:noFill/>
+        </p:spPr>
+        <p:txBody>
+          <a:bodyPr vert="horz" wrap="square" lIns="91440" tIns="45720" rIns="91440" bIns="45720" numCol="1" anchor="t" anchorCtr="0" compatLnSpc="1">
+            <a:prstTxWarp prst="textNoShape">
+              <a:avLst/>
+            </a:prstTxWarp>
+          </a:bodyPr>
+          <a:lstStyle/>
+          <a:p>
+            <a:endParaRPr lang="en-CA"/>
+          </a:p>
+        </p:txBody>
+      </p:sp>
+    </p:spTree>
+  </p:cSld>
+  <p:clrMapOvr>
+    <a:masterClrMapping/>
+  </p:clrMapOvr>
+  <p:timing>
+    <p:tnLst>
+      <p:par>
+        <p:cTn id="1" dur="indefinite" restart="never" nodeType="tmRoot">
+          <p:childTnLst>
+            <p:seq concurrent="1" nextAc="seek">
+              <p:cTn id="2" dur="indefinite" nodeType="mainSeq">
+                <p:childTnLst>
+                  <p:par>
+                    <p:cTn id="3" fill="hold">
+                      <p:stCondLst>
+                        <p:cond delay="indefinite"/>
+                      </p:stCondLst>
+                      <p:childTnLst>
+                        <p:par>
+                          <p:cTn id="4" fill="hold">
+                            <p:stCondLst>
+                              <p:cond delay="0"/>
+                            </p:stCondLst>
+                            <p:childTnLst>
+                              <p:par>
+                                <p:cTn id="5" presetID="5" presetClass="entr" presetSubtype="10" fill="hold" grpId="0" nodeType="clickEffect">
+                                  <p:stCondLst>
+                                    <p:cond delay="0"/>
+                                  </p:stCondLst>
+                                  <p:childTnLst>
+                                    <p:set>
+                                      <p:cBhvr>
+                                        <p:cTn id="6" dur="1" fill="hold">
+                                          <p:stCondLst>
+                                            <p:cond delay="0"/>
+                                          </p:stCondLst>
+                                        </p:cTn>
+                                        <p:tgtEl>
+                                          <p:spTgt spid="3">
+                                            <p:txEl>
+                                              <p:pRg st="0" end="0"/>
+                                            </p:txEl>
+                                          </p:spTgt>
+                                        </p:tgtEl>
+                                        <p:attrNameLst>
+                                          <p:attrName>style.visibility</p:attrName>
+                                        </p:attrNameLst>
+                                      </p:cBhvr>
+                                      <p:to>
+                                        <p:strVal val="visible"/>
+                                      </p:to>
+                                    </p:set>
+                                    <p:animEffect transition="in" filter="checkerboard(across)">
+                                      <p:cBhvr>
+                                        <p:cTn id="7" dur="500"/>
+                                        <p:tgtEl>
+                                          <p:spTgt spid="3">
+                                            <p:txEl>
+                                              <p:pRg st="0" end="0"/>
+                                            </p:txEl>
+                                          </p:spTgt>
+                                        </p:tgtEl>
+                                      </p:cBhvr>
+                                    </p:animEffect>
+                                  </p:childTnLst>
+                                </p:cTn>
+                              </p:par>
+                            </p:childTnLst>
+                          </p:cTn>
+                        </p:par>
+                      </p:childTnLst>
+                    </p:cTn>
+                  </p:par>
+                  <p:par>
+                    <p:cTn id="8" fill="hold">
+                      <p:stCondLst>
+                        <p:cond delay="indefinite"/>
+                      </p:stCondLst>
+                      <p:childTnLst>
+                        <p:par>
+                          <p:cTn id="9" fill="hold">
+                            <p:stCondLst>
+                              <p:cond delay="0"/>
+                            </p:stCondLst>
+                            <p:childTnLst>
+                              <p:par>
+                                <p:cTn id="10" presetID="5" presetClass="entr" presetSubtype="10" fill="hold" grpId="0" nodeType="clickEffect">
+                                  <p:stCondLst>
+                                    <p:cond delay="0"/>
+                                  </p:stCondLst>
+                                  <p:childTnLst>
+                                    <p:set>
+                                      <p:cBhvr>
+                                        <p:cTn id="11" dur="1" fill="hold">
+                                          <p:stCondLst>
+                                            <p:cond delay="0"/>
+                                          </p:stCondLst>
+                                        </p:cTn>
+                                        <p:tgtEl>
+                                          <p:spTgt spid="3">
+                                            <p:txEl>
+                                              <p:pRg st="1" end="1"/>
+                                            </p:txEl>
+                                          </p:spTgt>
+                                        </p:tgtEl>
+                                        <p:attrNameLst>
+                                          <p:attrName>style.visibility</p:attrName>
+                                        </p:attrNameLst>
+                                      </p:cBhvr>
+                                      <p:to>
+                                        <p:strVal val="visible"/>
+                                      </p:to>
+                                    </p:set>
+                                    <p:animEffect transition="in" filter="checkerboard(across)">
+                                      <p:cBhvr>
+                                        <p:cTn id="12" dur="500"/>
+                                        <p:tgtEl>
+                                          <p:spTgt spid="3">
+                                            <p:txEl>
+                                              <p:pRg st="1" end="1"/>
+                                            </p:txEl>
+                                          </p:spTgt>
+                                        </p:tgtEl>
+                                      </p:cBhvr>
+                                    </p:animEffect>
+                                  </p:childTnLst>
+                                </p:cTn>
+                              </p:par>
+                              <p:par>
+                                <p:cTn id="13" presetID="5" presetClass="entr" presetSubtype="10" fill="hold" grpId="0" nodeType="withEffect">
+                                  <p:stCondLst>
+                                    <p:cond delay="0"/>
+                                  </p:stCondLst>
+                                  <p:childTnLst>
+                                    <p:set>
+                                      <p:cBhvr>
+                                        <p:cTn id="14" dur="1" fill="hold">
+                                          <p:stCondLst>
+                                            <p:cond delay="0"/>
+                                          </p:stCondLst>
+                                        </p:cTn>
+                                        <p:tgtEl>
+                                          <p:spTgt spid="3">
+                                            <p:txEl>
+                                              <p:pRg st="2" end="2"/>
+                                            </p:txEl>
+                                          </p:spTgt>
+                                        </p:tgtEl>
+                                        <p:attrNameLst>
+                                          <p:attrName>style.visibility</p:attrName>
+                                        </p:attrNameLst>
+                                      </p:cBhvr>
+                                      <p:to>
+                                        <p:strVal val="visible"/>
+                                      </p:to>
+                                    </p:set>
+                                    <p:animEffect transition="in" filter="checkerboard(across)">
+                                      <p:cBhvr>
+                                        <p:cTn id="15" dur="500"/>
+                                        <p:tgtEl>
+                                          <p:spTgt spid="3">
+                                            <p:txEl>
+                                              <p:pRg st="2" end="2"/>
+                                            </p:txEl>
+                                          </p:spTgt>
+                                        </p:tgtEl>
+                                      </p:cBhvr>
+                                    </p:animEffect>
+                                  </p:childTnLst>
+                                </p:cTn>
+                              </p:par>
+                              <p:par>
+                                <p:cTn id="16" presetID="5" presetClass="entr" presetSubtype="10" fill="hold" grpId="0" nodeType="withEffect">
+                                  <p:stCondLst>
+                                    <p:cond delay="0"/>
+                                  </p:stCondLst>
+                                  <p:childTnLst>
+                                    <p:set>
+                                      <p:cBhvr>
+                                        <p:cTn id="17" dur="1" fill="hold">
+                                          <p:stCondLst>
+                                            <p:cond delay="0"/>
+                                          </p:stCondLst>
+                                        </p:cTn>
+                                        <p:tgtEl>
+                                          <p:spTgt spid="3">
+                                            <p:txEl>
+                                              <p:pRg st="3" end="3"/>
+                                            </p:txEl>
+                                          </p:spTgt>
+                                        </p:tgtEl>
+                                        <p:attrNameLst>
+                                          <p:attrName>style.visibility</p:attrName>
+                                        </p:attrNameLst>
+                                      </p:cBhvr>
+                                      <p:to>
+                                        <p:strVal val="visible"/>
+                                      </p:to>
+                                    </p:set>
+                                    <p:animEffect transition="in" filter="checkerboard(across)">
+                                      <p:cBhvr>
+                                        <p:cTn id="18" dur="500"/>
+                                        <p:tgtEl>
+                                          <p:spTgt spid="3">
+                                            <p:txEl>
+                                              <p:pRg st="3" end="3"/>
+                                            </p:txEl>
+                                          </p:spTgt>
+                                        </p:tgtEl>
+                                      </p:cBhvr>
+                                    </p:animEffect>
+                                  </p:childTnLst>
+                                </p:cTn>
+                              </p:par>
+                            </p:childTnLst>
+                          </p:cTn>
+                        </p:par>
+                      </p:childTnLst>
+                    </p:cTn>
+                  </p:par>
+                  <p:par>
+                    <p:cTn id="19" fill="hold">
+                      <p:stCondLst>
+                        <p:cond delay="indefinite"/>
+                      </p:stCondLst>
+                      <p:childTnLst>
+                        <p:par>
+                          <p:cTn id="20" fill="hold">
+                            <p:stCondLst>
+                              <p:cond delay="0"/>
+                            </p:stCondLst>
+                            <p:childTnLst>
+                              <p:par>
+                                <p:cTn id="21" presetID="5" presetClass="entr" presetSubtype="10" fill="hold" grpId="0" nodeType="clickEffect">
+                                  <p:stCondLst>
+                                    <p:cond delay="0"/>
+                                  </p:stCondLst>
+                                  <p:childTnLst>
+                                    <p:set>
+                                      <p:cBhvr>
+                                        <p:cTn id="22" dur="1" fill="hold">
+                                          <p:stCondLst>
+                                            <p:cond delay="0"/>
+                                          </p:stCondLst>
+                                        </p:cTn>
+                                        <p:tgtEl>
+                                          <p:spTgt spid="3">
+                                            <p:txEl>
+                                              <p:pRg st="4" end="4"/>
+                                            </p:txEl>
+                                          </p:spTgt>
+                                        </p:tgtEl>
+                                        <p:attrNameLst>
+                                          <p:attrName>style.visibility</p:attrName>
+                                        </p:attrNameLst>
+                                      </p:cBhvr>
+                                      <p:to>
+                                        <p:strVal val="visible"/>
+                                      </p:to>
+                                    </p:set>
+                                    <p:animEffect transition="in" filter="checkerboard(across)">
+                                      <p:cBhvr>
+                                        <p:cTn id="23" dur="500"/>
+                                        <p:tgtEl>
+                                          <p:spTgt spid="3">
+                                            <p:txEl>
+                                              <p:pRg st="4" end="4"/>
+                                            </p:txEl>
+                                          </p:spTgt>
+                                        </p:tgtEl>
+                                      </p:cBhvr>
+                                    </p:animEffect>
+                                  </p:childTnLst>
+                                </p:cTn>
+                              </p:par>
+                            </p:childTnLst>
+                          </p:cTn>
+                        </p:par>
+                      </p:childTnLst>
+                    </p:cTn>
+                  </p:par>
+                  <p:par>
+                    <p:cTn id="24" fill="hold">
+                      <p:stCondLst>
+                        <p:cond delay="indefinite"/>
+                      </p:stCondLst>
+                      <p:childTnLst>
+                        <p:par>
+                          <p:cTn id="25" fill="hold">
+                            <p:stCondLst>
+                              <p:cond delay="0"/>
+                            </p:stCondLst>
+                            <p:childTnLst>
+                              <p:par>
+                                <p:cTn id="26" presetID="5" presetClass="entr" presetSubtype="10" fill="hold" grpId="0" nodeType="clickEffect">
+                                  <p:stCondLst>
+                                    <p:cond delay="0"/>
+                                  </p:stCondLst>
+                                  <p:childTnLst>
+                                    <p:set>
+                                      <p:cBhvr>
+                                        <p:cTn id="27" dur="1" fill="hold">
+                                          <p:stCondLst>
+                                            <p:cond delay="0"/>
+                                          </p:stCondLst>
+                                        </p:cTn>
+                                        <p:tgtEl>
+                                          <p:spTgt spid="3">
+                                            <p:txEl>
+                                              <p:pRg st="5" end="5"/>
+                                            </p:txEl>
+                                          </p:spTgt>
+                                        </p:tgtEl>
+                                        <p:attrNameLst>
+                                          <p:attrName>style.visibility</p:attrName>
+                                        </p:attrNameLst>
+                                      </p:cBhvr>
+                                      <p:to>
+                                        <p:strVal val="visible"/>
+                                      </p:to>
+                                    </p:set>
+                                    <p:animEffect transition="in" filter="checkerboard(across)">
+                                      <p:cBhvr>
+                                        <p:cTn id="28" dur="500"/>
+                                        <p:tgtEl>
+                                          <p:spTgt spid="3">
+                                            <p:txEl>
+                                              <p:pRg st="5" end="5"/>
+                                            </p:txEl>
+                                          </p:spTgt>
+                                        </p:tgtEl>
+                                      </p:cBhvr>
+                                    </p:animEffect>
+                                  </p:childTnLst>
+                                </p:cTn>
+                              </p:par>
+                              <p:par>
+                                <p:cTn id="29" presetID="5" presetClass="entr" presetSubtype="10" fill="hold" grpId="0" nodeType="withEffect">
+                                  <p:stCondLst>
+                                    <p:cond delay="0"/>
+                                  </p:stCondLst>
+                                  <p:childTnLst>
+                                    <p:set>
+                                      <p:cBhvr>
+                                        <p:cTn id="30" dur="1" fill="hold">
+                                          <p:stCondLst>
+                                            <p:cond delay="0"/>
+                                          </p:stCondLst>
+                                        </p:cTn>
+                                        <p:tgtEl>
+                                          <p:spTgt spid="3">
+                                            <p:txEl>
+                                              <p:pRg st="6" end="6"/>
+                                            </p:txEl>
+                                          </p:spTgt>
+                                        </p:tgtEl>
+                                        <p:attrNameLst>
+                                          <p:attrName>style.visibility</p:attrName>
+                                        </p:attrNameLst>
+                                      </p:cBhvr>
+                                      <p:to>
+                                        <p:strVal val="visible"/>
+                                      </p:to>
+                                    </p:set>
+                                    <p:animEffect transition="in" filter="checkerboard(across)">
+                                      <p:cBhvr>
+                                        <p:cTn id="31" dur="500"/>
+                                        <p:tgtEl>
+                                          <p:spTgt spid="3">
+                                            <p:txEl>
+                                              <p:pRg st="6" end="6"/>
+                                            </p:txEl>
+                                          </p:spTgt>
+                                        </p:tgtEl>
+                                      </p:cBhvr>
+                                    </p:animEffect>
+                                  </p:childTnLst>
+                                </p:cTn>
+                              </p:par>
+                              <p:par>
+                                <p:cTn id="32" presetID="5" presetClass="entr" presetSubtype="10" fill="hold" grpId="0" nodeType="withEffect">
+                                  <p:stCondLst>
+                                    <p:cond delay="0"/>
+                                  </p:stCondLst>
+                                  <p:childTnLst>
+                                    <p:set>
+                                      <p:cBhvr>
+                                        <p:cTn id="33" dur="1" fill="hold">
+                                          <p:stCondLst>
+                                            <p:cond delay="0"/>
+                                          </p:stCondLst>
+                                        </p:cTn>
+                                        <p:tgtEl>
+                                          <p:spTgt spid="3">
+                                            <p:txEl>
+                                              <p:pRg st="7" end="7"/>
+                                            </p:txEl>
+                                          </p:spTgt>
+                                        </p:tgtEl>
+                                        <p:attrNameLst>
+                                          <p:attrName>style.visibility</p:attrName>
+                                        </p:attrNameLst>
+                                      </p:cBhvr>
+                                      <p:to>
+                                        <p:strVal val="visible"/>
+                                      </p:to>
+                                    </p:set>
+                                    <p:animEffect transition="in" filter="checkerboard(across)">
+                                      <p:cBhvr>
+                                        <p:cTn id="34" dur="500"/>
+                                        <p:tgtEl>
+                                          <p:spTgt spid="3">
+                                            <p:txEl>
+                                              <p:pRg st="7" end="7"/>
+                                            </p:txEl>
+                                          </p:spTgt>
+                                        </p:tgtEl>
+                                      </p:cBhvr>
+                                    </p:animEffect>
+                                  </p:childTnLst>
+                                </p:cTn>
+                              </p:par>
+                            </p:childTnLst>
+                          </p:cTn>
+                        </p:par>
+                      </p:childTnLst>
+                    </p:cTn>
+                  </p:par>
+                  <p:par>
+                    <p:cTn id="35" fill="hold">
+                      <p:stCondLst>
+                        <p:cond delay="indefinite"/>
+                      </p:stCondLst>
+                      <p:childTnLst>
+                        <p:par>
+                          <p:cTn id="36" fill="hold">
+                            <p:stCondLst>
+                              <p:cond delay="0"/>
+                            </p:stCondLst>
+                            <p:childTnLst>
+                              <p:par>
+                                <p:cTn id="37" presetID="10" presetClass="entr" presetSubtype="0" fill="hold" grpId="0" nodeType="clickEffect">
+                                  <p:stCondLst>
+                                    <p:cond delay="0"/>
+                                  </p:stCondLst>
+                                  <p:childTnLst>
+                                    <p:set>
+                                      <p:cBhvr>
+                                        <p:cTn id="38" dur="1" fill="hold">
+                                          <p:stCondLst>
+                                            <p:cond delay="0"/>
+                                          </p:stCondLst>
+                                        </p:cTn>
+                                        <p:tgtEl>
+                                          <p:spTgt spid="4"/>
+                                        </p:tgtEl>
+                                        <p:attrNameLst>
+                                          <p:attrName>style.visibility</p:attrName>
+                                        </p:attrNameLst>
+                                      </p:cBhvr>
+                                      <p:to>
+                                        <p:strVal val="visible"/>
+                                      </p:to>
+                                    </p:set>
+                                    <p:animEffect transition="in" filter="fade">
+                                      <p:cBhvr>
+                                        <p:cTn id="39" dur="500"/>
+                                        <p:tgtEl>
+                                          <p:spTgt spid="4"/>
+                                        </p:tgtEl>
+                                      </p:cBhvr>
+                                    </p:animEffect>
+                                  </p:childTnLst>
+                                </p:cTn>
+                              </p:par>
+                            </p:childTnLst>
+                          </p:cTn>
+                        </p:par>
+                      </p:childTnLst>
+                    </p:cTn>
+                  </p:par>
+                </p:childTnLst>
+              </p:cTn>
+              <p:prevCondLst>
+                <p:cond evt="onPrev" delay="0">
+                  <p:tgtEl>
+                    <p:sldTgt/>
+                  </p:tgtEl>
+                </p:cond>
+              </p:prevCondLst>
+              <p:nextCondLst>
+                <p:cond evt="onNext" delay="0">
+                  <p:tgtEl>
+                    <p:sldTgt/>
+                  </p:tgtEl>
+                </p:cond>
+              </p:nextCondLst>
+            </p:seq>
+          </p:childTnLst>
+        </p:cTn>
+      </p:par>
+    </p:tnLst>
+    <p:bldLst>
+      <p:bldP spid="3" grpId="0" build="p"/>
+      <p:bldP spid="4" grpId="0" animBg="1"/>
+    </p:bldLst>
+  </p:timing>
+</p:sld>
+</file>
+
+<file path=ppt/slides/slide40.xml><?xml version="1.0" encoding="utf-8"?>
+<p:sld xmlns:a="http://schemas.openxmlformats.org/drawingml/2006/main" xmlns:r="http://schemas.openxmlformats.org/officeDocument/2006/relationships" xmlns:p="http://schemas.openxmlformats.org/presentationml/2006/main">
+  <p:cSld>
+    <p:spTree>
+      <p:nvGrpSpPr>
+        <p:cNvPr id="1" name=""/>
+        <p:cNvGrpSpPr/>
+        <p:nvPr/>
+      </p:nvGrpSpPr>
+      <p:grpSpPr>
+        <a:xfrm>
+          <a:off x="0" y="0"/>
+          <a:ext cx="0" cy="0"/>
+          <a:chOff x="0" y="0"/>
+          <a:chExt cx="0" cy="0"/>
+        </a:xfrm>
+      </p:grpSpPr>
+      <p:sp>
+        <p:nvSpPr>
+          <p:cNvPr id="4" name="Rectangle: Rounded Corners 3">
+            <a:extLst>
+              <a:ext uri="{FF2B5EF4-FFF2-40B4-BE49-F238E27FC236}">
+                <a16:creationId xmlns:a16="http://schemas.microsoft.com/office/drawing/2014/main" id="{CE90FFEE-AC7E-C883-783F-4C067C53D87B}"/>
+              </a:ext>
+            </a:extLst>
+          </p:cNvPr>
+          <p:cNvSpPr/>
+          <p:nvPr/>
+        </p:nvSpPr>
+        <p:spPr>
+          <a:xfrm>
+            <a:off x="3459480" y="1200149"/>
+            <a:ext cx="1623060" cy="2032635"/>
+          </a:xfrm>
+          <a:prstGeom prst="roundRect">
+            <a:avLst/>
+          </a:prstGeom>
+        </p:spPr>
+        <p:style>
+          <a:lnRef idx="2">
+            <a:schemeClr val="accent1">
+              <a:shade val="15000"/>
+            </a:schemeClr>
+          </a:lnRef>
+          <a:fillRef idx="1">
+            <a:schemeClr val="accent1"/>
+          </a:fillRef>
+          <a:effectRef idx="0">
+            <a:schemeClr val="accent1"/>
+          </a:effectRef>
+          <a:fontRef idx="minor">
+            <a:schemeClr val="lt1"/>
+          </a:fontRef>
+        </p:style>
+        <p:txBody>
+          <a:bodyPr rtlCol="0" anchor="ctr"/>
+          <a:lstStyle/>
+          <a:p>
+            <a:pPr algn="ctr"/>
+            <a:r>
+              <a:rPr lang="en-CA" dirty="0"/>
+              <a:t>CODE</a:t>
+            </a:r>
+          </a:p>
+        </p:txBody>
+      </p:sp>
+      <p:sp>
+        <p:nvSpPr>
+          <p:cNvPr id="5" name="Rectangle 4">
+            <a:extLst>
+              <a:ext uri="{FF2B5EF4-FFF2-40B4-BE49-F238E27FC236}">
+                <a16:creationId xmlns:a16="http://schemas.microsoft.com/office/drawing/2014/main" id="{C4DE542D-6E92-7503-9416-D4B87C53712D}"/>
+              </a:ext>
+            </a:extLst>
+          </p:cNvPr>
+          <p:cNvSpPr/>
+          <p:nvPr/>
+        </p:nvSpPr>
+        <p:spPr>
+          <a:xfrm>
+            <a:off x="5920740" y="1581150"/>
+            <a:ext cx="1828800" cy="1371601"/>
+          </a:xfrm>
+          <a:prstGeom prst="rect">
+            <a:avLst/>
+          </a:prstGeom>
+        </p:spPr>
+        <p:style>
+          <a:lnRef idx="2">
+            <a:schemeClr val="accent1">
+              <a:shade val="15000"/>
+            </a:schemeClr>
+          </a:lnRef>
+          <a:fillRef idx="1">
+            <a:schemeClr val="accent1"/>
+          </a:fillRef>
+          <a:effectRef idx="0">
+            <a:schemeClr val="accent1"/>
+          </a:effectRef>
+          <a:fontRef idx="minor">
+            <a:schemeClr val="lt1"/>
+          </a:fontRef>
+        </p:style>
+        <p:txBody>
+          <a:bodyPr rtlCol="0" anchor="ctr"/>
+          <a:lstStyle/>
+          <a:p>
+            <a:pPr algn="ctr"/>
+            <a:r>
+              <a:rPr lang="en-CA" dirty="0"/>
+              <a:t>Data</a:t>
+            </a:r>
+          </a:p>
+        </p:txBody>
+      </p:sp>
+      <p:sp>
+        <p:nvSpPr>
+          <p:cNvPr id="6" name="Rectangle: Diagonal Corners Rounded 5">
+            <a:extLst>
+              <a:ext uri="{FF2B5EF4-FFF2-40B4-BE49-F238E27FC236}">
+                <a16:creationId xmlns:a16="http://schemas.microsoft.com/office/drawing/2014/main" id="{55D3CC22-F543-A3BC-E7B9-8658D8687F83}"/>
+              </a:ext>
+            </a:extLst>
+          </p:cNvPr>
+          <p:cNvSpPr/>
+          <p:nvPr/>
+        </p:nvSpPr>
+        <p:spPr>
+          <a:xfrm>
+            <a:off x="640080" y="1721168"/>
+            <a:ext cx="2133600" cy="1066800"/>
+          </a:xfrm>
+          <a:prstGeom prst="round2DiagRect">
+            <a:avLst/>
+          </a:prstGeom>
+        </p:spPr>
+        <p:style>
+          <a:lnRef idx="2">
+            <a:schemeClr val="accent1">
+              <a:shade val="15000"/>
+            </a:schemeClr>
+          </a:lnRef>
+          <a:fillRef idx="1">
+            <a:schemeClr val="accent1"/>
+          </a:fillRef>
+          <a:effectRef idx="0">
+            <a:schemeClr val="accent1"/>
+          </a:effectRef>
+          <a:fontRef idx="minor">
+            <a:schemeClr val="lt1"/>
+          </a:fontRef>
+        </p:style>
+        <p:txBody>
+          <a:bodyPr rtlCol="0" anchor="ctr"/>
+          <a:lstStyle/>
+          <a:p>
+            <a:pPr algn="ctr"/>
+            <a:r>
+              <a:rPr lang="en-CA" dirty="0"/>
+              <a:t>Data</a:t>
+            </a:r>
+          </a:p>
+        </p:txBody>
+      </p:sp>
+      <p:sp>
+        <p:nvSpPr>
+          <p:cNvPr id="7" name="Arrow: Right 6">
+            <a:extLst>
+              <a:ext uri="{FF2B5EF4-FFF2-40B4-BE49-F238E27FC236}">
+                <a16:creationId xmlns:a16="http://schemas.microsoft.com/office/drawing/2014/main" id="{ACA15230-9B52-B213-65F9-EE285A32B83D}"/>
+              </a:ext>
+            </a:extLst>
+          </p:cNvPr>
+          <p:cNvSpPr/>
+          <p:nvPr/>
+        </p:nvSpPr>
+        <p:spPr>
+          <a:xfrm>
+            <a:off x="2773680" y="1949768"/>
+            <a:ext cx="685800" cy="533400"/>
+          </a:xfrm>
+          <a:prstGeom prst="rightArrow">
+            <a:avLst/>
+          </a:prstGeom>
+        </p:spPr>
+        <p:style>
+          <a:lnRef idx="2">
+            <a:schemeClr val="accent1">
+              <a:shade val="15000"/>
+            </a:schemeClr>
+          </a:lnRef>
+          <a:fillRef idx="1">
+            <a:schemeClr val="accent1"/>
+          </a:fillRef>
+          <a:effectRef idx="0">
+            <a:schemeClr val="accent1"/>
+          </a:effectRef>
+          <a:fontRef idx="minor">
+            <a:schemeClr val="lt1"/>
+          </a:fontRef>
+        </p:style>
+        <p:txBody>
+          <a:bodyPr rtlCol="0" anchor="ctr"/>
+          <a:lstStyle/>
+          <a:p>
+            <a:pPr algn="ctr"/>
+            <a:endParaRPr lang="en-CA"/>
+          </a:p>
+        </p:txBody>
+      </p:sp>
+      <p:sp>
+        <p:nvSpPr>
+          <p:cNvPr id="8" name="Arrow: Right 7">
+            <a:extLst>
+              <a:ext uri="{FF2B5EF4-FFF2-40B4-BE49-F238E27FC236}">
+                <a16:creationId xmlns:a16="http://schemas.microsoft.com/office/drawing/2014/main" id="{69E37798-AE55-7728-9CC8-3FFBD057F979}"/>
+              </a:ext>
+            </a:extLst>
+          </p:cNvPr>
+          <p:cNvSpPr/>
+          <p:nvPr/>
+        </p:nvSpPr>
+        <p:spPr>
+          <a:xfrm>
+            <a:off x="5128260" y="1949768"/>
+            <a:ext cx="769620" cy="533400"/>
+          </a:xfrm>
+          <a:prstGeom prst="rightArrow">
+            <a:avLst/>
+          </a:prstGeom>
+        </p:spPr>
+        <p:style>
+          <a:lnRef idx="2">
+            <a:schemeClr val="accent1">
+              <a:shade val="15000"/>
+            </a:schemeClr>
+          </a:lnRef>
+          <a:fillRef idx="1">
+            <a:schemeClr val="accent1"/>
+          </a:fillRef>
+          <a:effectRef idx="0">
+            <a:schemeClr val="accent1"/>
+          </a:effectRef>
+          <a:fontRef idx="minor">
+            <a:schemeClr val="lt1"/>
+          </a:fontRef>
+        </p:style>
+        <p:txBody>
+          <a:bodyPr rtlCol="0" anchor="ctr"/>
+          <a:lstStyle/>
+          <a:p>
+            <a:pPr algn="ctr"/>
+            <a:endParaRPr lang="en-CA"/>
+          </a:p>
+        </p:txBody>
+      </p:sp>
+    </p:spTree>
+    <p:extLst>
+      <p:ext uri="{BB962C8B-B14F-4D97-AF65-F5344CB8AC3E}">
+        <p14:creationId xmlns:p14="http://schemas.microsoft.com/office/powerpoint/2010/main" val="1052759186"/>
+      </p:ext>
+    </p:extLst>
+  </p:cSld>
+  <p:clrMapOvr>
+    <a:masterClrMapping/>
+  </p:clrMapOvr>
+</p:sld>
+</file>
+
+<file path=ppt/slides/slide41.xml><?xml version="1.0" encoding="utf-8"?>
+<p:sld xmlns:a="http://schemas.openxmlformats.org/drawingml/2006/main" xmlns:r="http://schemas.openxmlformats.org/officeDocument/2006/relationships" xmlns:p="http://schemas.openxmlformats.org/presentationml/2006/main">
+  <p:cSld>
+    <p:spTree>
+      <p:nvGrpSpPr>
+        <p:cNvPr id="1" name=""/>
+        <p:cNvGrpSpPr/>
+        <p:nvPr/>
+      </p:nvGrpSpPr>
+      <p:grpSpPr>
+        <a:xfrm>
+          <a:off x="0" y="0"/>
+          <a:ext cx="0" cy="0"/>
+          <a:chOff x="0" y="0"/>
+          <a:chExt cx="0" cy="0"/>
+        </a:xfrm>
+      </p:grpSpPr>
+      <p:sp>
+        <p:nvSpPr>
+          <p:cNvPr id="4" name="Rectangle: Rounded Corners 3">
+            <a:extLst>
+              <a:ext uri="{FF2B5EF4-FFF2-40B4-BE49-F238E27FC236}">
+                <a16:creationId xmlns:a16="http://schemas.microsoft.com/office/drawing/2014/main" id="{CE90FFEE-AC7E-C883-783F-4C067C53D87B}"/>
+              </a:ext>
+            </a:extLst>
+          </p:cNvPr>
+          <p:cNvSpPr/>
+          <p:nvPr/>
+        </p:nvSpPr>
+        <p:spPr>
+          <a:xfrm>
+            <a:off x="3402330" y="285749"/>
+            <a:ext cx="1828800" cy="1371601"/>
+          </a:xfrm>
+          <a:prstGeom prst="roundRect">
+            <a:avLst/>
+          </a:prstGeom>
+        </p:spPr>
+        <p:style>
+          <a:lnRef idx="2">
+            <a:schemeClr val="accent1">
+              <a:shade val="15000"/>
+            </a:schemeClr>
+          </a:lnRef>
+          <a:fillRef idx="1">
+            <a:schemeClr val="accent1"/>
+          </a:fillRef>
+          <a:effectRef idx="0">
+            <a:schemeClr val="accent1"/>
+          </a:effectRef>
+          <a:fontRef idx="minor">
+            <a:schemeClr val="lt1"/>
+          </a:fontRef>
+        </p:style>
+        <p:txBody>
+          <a:bodyPr rtlCol="0" anchor="ctr"/>
+          <a:lstStyle/>
+          <a:p>
+            <a:pPr algn="ctr"/>
+            <a:r>
+              <a:rPr lang="en-CA" dirty="0"/>
+              <a:t>theMain.obj</a:t>
+            </a:r>
+          </a:p>
+        </p:txBody>
+      </p:sp>
+      <p:sp>
+        <p:nvSpPr>
+          <p:cNvPr id="5" name="Rectangle 4">
+            <a:extLst>
+              <a:ext uri="{FF2B5EF4-FFF2-40B4-BE49-F238E27FC236}">
+                <a16:creationId xmlns:a16="http://schemas.microsoft.com/office/drawing/2014/main" id="{C4DE542D-6E92-7503-9416-D4B87C53712D}"/>
+              </a:ext>
+            </a:extLst>
+          </p:cNvPr>
+          <p:cNvSpPr/>
+          <p:nvPr/>
+        </p:nvSpPr>
+        <p:spPr>
+          <a:xfrm>
+            <a:off x="6885119" y="1801906"/>
+            <a:ext cx="1828800" cy="1371601"/>
+          </a:xfrm>
+          <a:prstGeom prst="rect">
+            <a:avLst/>
+          </a:prstGeom>
+        </p:spPr>
+        <p:style>
+          <a:lnRef idx="2">
+            <a:schemeClr val="accent1">
+              <a:shade val="15000"/>
+            </a:schemeClr>
+          </a:lnRef>
+          <a:fillRef idx="1">
+            <a:schemeClr val="accent1"/>
+          </a:fillRef>
+          <a:effectRef idx="0">
+            <a:schemeClr val="accent1"/>
+          </a:effectRef>
+          <a:fontRef idx="minor">
+            <a:schemeClr val="lt1"/>
+          </a:fontRef>
+        </p:style>
+        <p:txBody>
+          <a:bodyPr rtlCol="0" anchor="ctr"/>
+          <a:lstStyle/>
+          <a:p>
+            <a:pPr algn="ctr"/>
+            <a:r>
+              <a:rPr lang="en-CA" dirty="0"/>
+              <a:t>exe</a:t>
+            </a:r>
+          </a:p>
+        </p:txBody>
+      </p:sp>
+      <p:sp>
+        <p:nvSpPr>
+          <p:cNvPr id="6" name="Rectangle: Diagonal Corners Rounded 5">
+            <a:extLst>
+              <a:ext uri="{FF2B5EF4-FFF2-40B4-BE49-F238E27FC236}">
+                <a16:creationId xmlns:a16="http://schemas.microsoft.com/office/drawing/2014/main" id="{55D3CC22-F543-A3BC-E7B9-8658D8687F83}"/>
+              </a:ext>
+            </a:extLst>
+          </p:cNvPr>
+          <p:cNvSpPr/>
+          <p:nvPr/>
+        </p:nvSpPr>
+        <p:spPr>
+          <a:xfrm>
+            <a:off x="533400" y="438150"/>
+            <a:ext cx="2133600" cy="1066800"/>
+          </a:xfrm>
+          <a:prstGeom prst="round2DiagRect">
+            <a:avLst/>
+          </a:prstGeom>
+        </p:spPr>
+        <p:style>
+          <a:lnRef idx="2">
+            <a:schemeClr val="accent1">
+              <a:shade val="15000"/>
+            </a:schemeClr>
+          </a:lnRef>
+          <a:fillRef idx="1">
+            <a:schemeClr val="accent1"/>
+          </a:fillRef>
+          <a:effectRef idx="0">
+            <a:schemeClr val="accent1"/>
+          </a:effectRef>
+          <a:fontRef idx="minor">
+            <a:schemeClr val="lt1"/>
+          </a:fontRef>
+        </p:style>
+        <p:txBody>
+          <a:bodyPr rtlCol="0" anchor="ctr"/>
+          <a:lstStyle/>
+          <a:p>
+            <a:pPr algn="ctr"/>
+            <a:r>
+              <a:rPr lang="en-CA" dirty="0"/>
+              <a:t>theMain.cpp</a:t>
+            </a:r>
+          </a:p>
+        </p:txBody>
+      </p:sp>
+      <p:sp>
+        <p:nvSpPr>
+          <p:cNvPr id="7" name="Arrow: Right 6">
+            <a:extLst>
+              <a:ext uri="{FF2B5EF4-FFF2-40B4-BE49-F238E27FC236}">
+                <a16:creationId xmlns:a16="http://schemas.microsoft.com/office/drawing/2014/main" id="{ACA15230-9B52-B213-65F9-EE285A32B83D}"/>
+              </a:ext>
+            </a:extLst>
+          </p:cNvPr>
+          <p:cNvSpPr/>
+          <p:nvPr/>
+        </p:nvSpPr>
+        <p:spPr>
+          <a:xfrm>
+            <a:off x="2667000" y="704850"/>
+            <a:ext cx="685800" cy="533400"/>
+          </a:xfrm>
+          <a:prstGeom prst="rightArrow">
+            <a:avLst/>
+          </a:prstGeom>
+        </p:spPr>
+        <p:style>
+          <a:lnRef idx="2">
+            <a:schemeClr val="accent1">
+              <a:shade val="15000"/>
+            </a:schemeClr>
+          </a:lnRef>
+          <a:fillRef idx="1">
+            <a:schemeClr val="accent1"/>
+          </a:fillRef>
+          <a:effectRef idx="0">
+            <a:schemeClr val="accent1"/>
+          </a:effectRef>
+          <a:fontRef idx="minor">
+            <a:schemeClr val="lt1"/>
+          </a:fontRef>
+        </p:style>
+        <p:txBody>
+          <a:bodyPr rtlCol="0" anchor="ctr"/>
+          <a:lstStyle/>
+          <a:p>
+            <a:pPr algn="ctr"/>
+            <a:endParaRPr lang="en-CA"/>
+          </a:p>
+        </p:txBody>
+      </p:sp>
+      <p:sp>
+        <p:nvSpPr>
+          <p:cNvPr id="2" name="Rectangle: Rounded Corners 1">
+            <a:extLst>
+              <a:ext uri="{FF2B5EF4-FFF2-40B4-BE49-F238E27FC236}">
+                <a16:creationId xmlns:a16="http://schemas.microsoft.com/office/drawing/2014/main" id="{F8B2196B-872F-7687-7079-B513198873DB}"/>
+              </a:ext>
+            </a:extLst>
+          </p:cNvPr>
+          <p:cNvSpPr/>
+          <p:nvPr/>
+        </p:nvSpPr>
+        <p:spPr>
+          <a:xfrm>
+            <a:off x="3379918" y="1847849"/>
+            <a:ext cx="1828800" cy="1371601"/>
+          </a:xfrm>
+          <a:prstGeom prst="roundRect">
+            <a:avLst/>
+          </a:prstGeom>
+        </p:spPr>
+        <p:style>
+          <a:lnRef idx="2">
+            <a:schemeClr val="accent1">
+              <a:shade val="15000"/>
+            </a:schemeClr>
+          </a:lnRef>
+          <a:fillRef idx="1">
+            <a:schemeClr val="accent1"/>
+          </a:fillRef>
+          <a:effectRef idx="0">
+            <a:schemeClr val="accent1"/>
+          </a:effectRef>
+          <a:fontRef idx="minor">
+            <a:schemeClr val="lt1"/>
+          </a:fontRef>
+        </p:style>
+        <p:txBody>
+          <a:bodyPr rtlCol="0" anchor="ctr"/>
+          <a:lstStyle/>
+          <a:p>
+            <a:pPr algn="ctr"/>
+            <a:r>
+              <a:rPr lang="en-CA" dirty="0"/>
+              <a:t>Glad.obj</a:t>
+            </a:r>
+          </a:p>
+        </p:txBody>
+      </p:sp>
+      <p:sp>
+        <p:nvSpPr>
+          <p:cNvPr id="3" name="Rectangle: Diagonal Corners Rounded 2">
+            <a:extLst>
+              <a:ext uri="{FF2B5EF4-FFF2-40B4-BE49-F238E27FC236}">
+                <a16:creationId xmlns:a16="http://schemas.microsoft.com/office/drawing/2014/main" id="{F5754FDA-1524-284A-E003-95137008C5DE}"/>
+              </a:ext>
+            </a:extLst>
+          </p:cNvPr>
+          <p:cNvSpPr/>
+          <p:nvPr/>
+        </p:nvSpPr>
+        <p:spPr>
+          <a:xfrm>
+            <a:off x="510988" y="2000250"/>
+            <a:ext cx="2133600" cy="1066800"/>
+          </a:xfrm>
+          <a:prstGeom prst="round2DiagRect">
+            <a:avLst/>
+          </a:prstGeom>
+        </p:spPr>
+        <p:style>
+          <a:lnRef idx="2">
+            <a:schemeClr val="accent1">
+              <a:shade val="15000"/>
+            </a:schemeClr>
+          </a:lnRef>
+          <a:fillRef idx="1">
+            <a:schemeClr val="accent1"/>
+          </a:fillRef>
+          <a:effectRef idx="0">
+            <a:schemeClr val="accent1"/>
+          </a:effectRef>
+          <a:fontRef idx="minor">
+            <a:schemeClr val="lt1"/>
+          </a:fontRef>
+        </p:style>
+        <p:txBody>
+          <a:bodyPr rtlCol="0" anchor="ctr"/>
+          <a:lstStyle/>
+          <a:p>
+            <a:pPr algn="ctr"/>
+            <a:r>
+              <a:rPr lang="en-CA" dirty="0" err="1"/>
+              <a:t>Glad.c</a:t>
+            </a:r>
+            <a:endParaRPr lang="en-CA" dirty="0"/>
+          </a:p>
+        </p:txBody>
+      </p:sp>
+      <p:sp>
+        <p:nvSpPr>
+          <p:cNvPr id="9" name="Arrow: Right 8">
+            <a:extLst>
+              <a:ext uri="{FF2B5EF4-FFF2-40B4-BE49-F238E27FC236}">
+                <a16:creationId xmlns:a16="http://schemas.microsoft.com/office/drawing/2014/main" id="{1647A79D-7FC4-CC07-FCB0-0AC2E0C6AFD2}"/>
+              </a:ext>
+            </a:extLst>
+          </p:cNvPr>
+          <p:cNvSpPr/>
+          <p:nvPr/>
+        </p:nvSpPr>
+        <p:spPr>
+          <a:xfrm>
+            <a:off x="2644588" y="2266950"/>
+            <a:ext cx="685800" cy="533400"/>
+          </a:xfrm>
+          <a:prstGeom prst="rightArrow">
+            <a:avLst/>
+          </a:prstGeom>
+        </p:spPr>
+        <p:style>
+          <a:lnRef idx="2">
+            <a:schemeClr val="accent1">
+              <a:shade val="15000"/>
+            </a:schemeClr>
+          </a:lnRef>
+          <a:fillRef idx="1">
+            <a:schemeClr val="accent1"/>
+          </a:fillRef>
+          <a:effectRef idx="0">
+            <a:schemeClr val="accent1"/>
+          </a:effectRef>
+          <a:fontRef idx="minor">
+            <a:schemeClr val="lt1"/>
+          </a:fontRef>
+        </p:style>
+        <p:txBody>
+          <a:bodyPr rtlCol="0" anchor="ctr"/>
+          <a:lstStyle/>
+          <a:p>
+            <a:pPr algn="ctr"/>
+            <a:endParaRPr lang="en-CA"/>
+          </a:p>
+        </p:txBody>
+      </p:sp>
+      <p:sp>
+        <p:nvSpPr>
+          <p:cNvPr id="10" name="Rectangle: Diagonal Corners Rounded 9">
+            <a:extLst>
+              <a:ext uri="{FF2B5EF4-FFF2-40B4-BE49-F238E27FC236}">
+                <a16:creationId xmlns:a16="http://schemas.microsoft.com/office/drawing/2014/main" id="{3F38CC8B-C137-1878-1A3B-EA3949624FE5}"/>
+              </a:ext>
+            </a:extLst>
+          </p:cNvPr>
+          <p:cNvSpPr/>
+          <p:nvPr/>
+        </p:nvSpPr>
+        <p:spPr>
+          <a:xfrm>
+            <a:off x="497541" y="3409950"/>
+            <a:ext cx="2133600" cy="1066800"/>
+          </a:xfrm>
+          <a:prstGeom prst="round2DiagRect">
+            <a:avLst/>
+          </a:prstGeom>
+        </p:spPr>
+        <p:style>
+          <a:lnRef idx="2">
+            <a:schemeClr val="accent1">
+              <a:shade val="15000"/>
+            </a:schemeClr>
+          </a:lnRef>
+          <a:fillRef idx="1">
+            <a:schemeClr val="accent1"/>
+          </a:fillRef>
+          <a:effectRef idx="0">
+            <a:schemeClr val="accent1"/>
+          </a:effectRef>
+          <a:fontRef idx="minor">
+            <a:schemeClr val="lt1"/>
+          </a:fontRef>
+        </p:style>
+        <p:txBody>
+          <a:bodyPr rtlCol="0" anchor="ctr"/>
+          <a:lstStyle/>
+          <a:p>
+            <a:pPr algn="ctr"/>
+            <a:r>
+              <a:rPr lang="en-CA" dirty="0" err="1"/>
+              <a:t>cout</a:t>
+            </a:r>
+            <a:endParaRPr lang="en-CA" dirty="0"/>
+          </a:p>
+        </p:txBody>
+      </p:sp>
+      <p:sp>
+        <p:nvSpPr>
+          <p:cNvPr id="11" name="Rectangle: Rounded Corners 10">
+            <a:extLst>
+              <a:ext uri="{FF2B5EF4-FFF2-40B4-BE49-F238E27FC236}">
+                <a16:creationId xmlns:a16="http://schemas.microsoft.com/office/drawing/2014/main" id="{89D83563-B42F-C6B8-4250-6079C5CD6E26}"/>
+              </a:ext>
+            </a:extLst>
+          </p:cNvPr>
+          <p:cNvSpPr/>
+          <p:nvPr/>
+        </p:nvSpPr>
+        <p:spPr>
+          <a:xfrm>
+            <a:off x="3402330" y="3409950"/>
+            <a:ext cx="1828800" cy="1143003"/>
+          </a:xfrm>
+          <a:prstGeom prst="roundRect">
+            <a:avLst/>
+          </a:prstGeom>
+        </p:spPr>
+        <p:style>
+          <a:lnRef idx="2">
+            <a:schemeClr val="accent1">
+              <a:shade val="15000"/>
+            </a:schemeClr>
+          </a:lnRef>
+          <a:fillRef idx="1">
+            <a:schemeClr val="accent1"/>
+          </a:fillRef>
+          <a:effectRef idx="0">
+            <a:schemeClr val="accent1"/>
+          </a:effectRef>
+          <a:fontRef idx="minor">
+            <a:schemeClr val="lt1"/>
+          </a:fontRef>
+        </p:style>
+        <p:txBody>
+          <a:bodyPr rtlCol="0" anchor="ctr"/>
+          <a:lstStyle/>
+          <a:p>
+            <a:pPr algn="ctr"/>
+            <a:r>
+              <a:rPr lang="en-CA" dirty="0"/>
+              <a:t>Glad.obj</a:t>
+            </a:r>
+          </a:p>
+        </p:txBody>
+      </p:sp>
+      <p:sp>
+        <p:nvSpPr>
+          <p:cNvPr id="12" name="Arrow: Right 11">
+            <a:extLst>
+              <a:ext uri="{FF2B5EF4-FFF2-40B4-BE49-F238E27FC236}">
+                <a16:creationId xmlns:a16="http://schemas.microsoft.com/office/drawing/2014/main" id="{30430B25-07AE-9498-E1D5-D71733197880}"/>
+              </a:ext>
+            </a:extLst>
+          </p:cNvPr>
+          <p:cNvSpPr/>
+          <p:nvPr/>
+        </p:nvSpPr>
+        <p:spPr>
+          <a:xfrm>
+            <a:off x="2667000" y="3600453"/>
+            <a:ext cx="685800" cy="533400"/>
+          </a:xfrm>
+          <a:prstGeom prst="rightArrow">
+            <a:avLst/>
+          </a:prstGeom>
+        </p:spPr>
+        <p:style>
+          <a:lnRef idx="2">
+            <a:schemeClr val="accent1">
+              <a:shade val="15000"/>
+            </a:schemeClr>
+          </a:lnRef>
+          <a:fillRef idx="1">
+            <a:schemeClr val="accent1"/>
+          </a:fillRef>
+          <a:effectRef idx="0">
+            <a:schemeClr val="accent1"/>
+          </a:effectRef>
+          <a:fontRef idx="minor">
+            <a:schemeClr val="lt1"/>
+          </a:fontRef>
+        </p:style>
+        <p:txBody>
+          <a:bodyPr rtlCol="0" anchor="ctr"/>
+          <a:lstStyle/>
+          <a:p>
+            <a:pPr algn="ctr"/>
+            <a:endParaRPr lang="en-CA"/>
+          </a:p>
+        </p:txBody>
+      </p:sp>
+      <p:sp>
+        <p:nvSpPr>
+          <p:cNvPr id="13" name="Arrow: Right 12">
+            <a:extLst>
+              <a:ext uri="{FF2B5EF4-FFF2-40B4-BE49-F238E27FC236}">
+                <a16:creationId xmlns:a16="http://schemas.microsoft.com/office/drawing/2014/main" id="{E4040D52-CE92-D1F6-924E-ADA301EADBA2}"/>
+              </a:ext>
+            </a:extLst>
+          </p:cNvPr>
+          <p:cNvSpPr/>
+          <p:nvPr/>
+        </p:nvSpPr>
+        <p:spPr>
+          <a:xfrm>
+            <a:off x="5463988" y="2048435"/>
+            <a:ext cx="1394012" cy="1104900"/>
+          </a:xfrm>
+          <a:prstGeom prst="rightArrow">
+            <a:avLst/>
+          </a:prstGeom>
+        </p:spPr>
+        <p:style>
+          <a:lnRef idx="2">
+            <a:schemeClr val="accent1">
+              <a:shade val="15000"/>
+            </a:schemeClr>
+          </a:lnRef>
+          <a:fillRef idx="1">
+            <a:schemeClr val="accent1"/>
+          </a:fillRef>
+          <a:effectRef idx="0">
+            <a:schemeClr val="accent1"/>
+          </a:effectRef>
+          <a:fontRef idx="minor">
+            <a:schemeClr val="lt1"/>
+          </a:fontRef>
+        </p:style>
+        <p:txBody>
+          <a:bodyPr rtlCol="0" anchor="ctr"/>
+          <a:lstStyle/>
+          <a:p>
+            <a:pPr algn="ctr"/>
+            <a:r>
+              <a:rPr lang="en-CA" dirty="0"/>
+              <a:t>Link</a:t>
+            </a:r>
+          </a:p>
+        </p:txBody>
+      </p:sp>
+    </p:spTree>
+    <p:extLst>
+      <p:ext uri="{BB962C8B-B14F-4D97-AF65-F5344CB8AC3E}">
+        <p14:creationId xmlns:p14="http://schemas.microsoft.com/office/powerpoint/2010/main" val="2868077081"/>
+      </p:ext>
+    </p:extLst>
+  </p:cSld>
+  <p:clrMapOvr>
+    <a:masterClrMapping/>
+  </p:clrMapOvr>
+</p:sld>
+</file>
+
+<file path=ppt/slides/slide42.xml><?xml version="1.0" encoding="utf-8"?>
+<p:sld xmlns:a="http://schemas.openxmlformats.org/drawingml/2006/main" xmlns:r="http://schemas.openxmlformats.org/officeDocument/2006/relationships" xmlns:p="http://schemas.openxmlformats.org/presentationml/2006/main">
+  <p:cSld>
+    <p:spTree>
+      <p:nvGrpSpPr>
+        <p:cNvPr id="1" name=""/>
+        <p:cNvGrpSpPr/>
+        <p:nvPr/>
+      </p:nvGrpSpPr>
+      <p:grpSpPr>
+        <a:xfrm>
+          <a:off x="0" y="0"/>
+          <a:ext cx="0" cy="0"/>
+          <a:chOff x="0" y="0"/>
+          <a:chExt cx="0" cy="0"/>
+        </a:xfrm>
+      </p:grpSpPr>
       <p:pic>
         <p:nvPicPr>
           <p:cNvPr id="50178" name="Picture 2" descr="http://images2.fanpop.com/images/photos/3200000/Professor-Farnsworth-futurama-3295264-1024-768.jpg"/>
@@ -22341,759 +24356,6 @@
   <p:clrMapOvr>
     <a:masterClrMapping/>
   </p:clrMapOvr>
-</p:sld>
-</file>
-
-<file path=ppt/slides/slide4.xml><?xml version="1.0" encoding="utf-8"?>
-<p:sld xmlns:a="http://schemas.openxmlformats.org/drawingml/2006/main" xmlns:r="http://schemas.openxmlformats.org/officeDocument/2006/relationships" xmlns:p="http://schemas.openxmlformats.org/presentationml/2006/main">
-  <p:cSld>
-    <p:spTree>
-      <p:nvGrpSpPr>
-        <p:cNvPr id="1" name=""/>
-        <p:cNvGrpSpPr/>
-        <p:nvPr/>
-      </p:nvGrpSpPr>
-      <p:grpSpPr>
-        <a:xfrm>
-          <a:off x="0" y="0"/>
-          <a:ext cx="0" cy="0"/>
-          <a:chOff x="0" y="0"/>
-          <a:chExt cx="0" cy="0"/>
-        </a:xfrm>
-      </p:grpSpPr>
-      <p:sp>
-        <p:nvSpPr>
-          <p:cNvPr id="2" name="Title 1"/>
-          <p:cNvSpPr>
-            <a:spLocks noGrp="1"/>
-          </p:cNvSpPr>
-          <p:nvPr>
-            <p:ph type="title"/>
-          </p:nvPr>
-        </p:nvSpPr>
-        <p:spPr>
-          <a:xfrm>
-            <a:off x="457200" y="114300"/>
-            <a:ext cx="3200400" cy="914400"/>
-          </a:xfrm>
-        </p:spPr>
-        <p:txBody>
-          <a:bodyPr/>
-          <a:lstStyle/>
-          <a:p>
-            <a:pPr>
-              <a:defRPr/>
-            </a:pPr>
-            <a:r>
-              <a:rPr lang="en-CA" dirty="0"/>
-              <a:t>Text books:</a:t>
-            </a:r>
-          </a:p>
-        </p:txBody>
-      </p:sp>
-      <p:sp>
-        <p:nvSpPr>
-          <p:cNvPr id="3" name="Content Placeholder 2"/>
-          <p:cNvSpPr>
-            <a:spLocks noGrp="1"/>
-          </p:cNvSpPr>
-          <p:nvPr>
-            <p:ph idx="1"/>
-          </p:nvPr>
-        </p:nvSpPr>
-        <p:spPr>
-          <a:xfrm>
-            <a:off x="381000" y="1200150"/>
-            <a:ext cx="8229600" cy="3200400"/>
-          </a:xfrm>
-        </p:spPr>
-        <p:txBody>
-          <a:bodyPr>
-            <a:normAutofit fontScale="62500" lnSpcReduction="20000"/>
-          </a:bodyPr>
-          <a:lstStyle/>
-          <a:p>
-            <a:r>
-              <a:rPr lang="en-CA" sz="2600" dirty="0"/>
-              <a:t>The definitive source is </a:t>
-            </a:r>
-            <a:r>
-              <a:rPr lang="en-CA" sz="2600" dirty="0">
-                <a:hlinkClick r:id="rId2"/>
-              </a:rPr>
-              <a:t>www.opengl.org</a:t>
-            </a:r>
-            <a:r>
-              <a:rPr lang="en-CA" sz="2600" dirty="0"/>
-              <a:t> (though this is an OpenGL reference, not a “learn OpenGL” sort of thing. Certainly </a:t>
-            </a:r>
-            <a:r>
-              <a:rPr lang="en-CA" sz="2600" i="1" u="sng" dirty="0"/>
-              <a:t>not</a:t>
-            </a:r>
-            <a:r>
-              <a:rPr lang="en-CA" sz="2600" dirty="0"/>
-              <a:t> a “learn 3D graphics” site...)</a:t>
-            </a:r>
-            <a:endParaRPr lang="en-CA" sz="2300" dirty="0"/>
-          </a:p>
-          <a:p>
-            <a:r>
-              <a:rPr lang="en-CA" sz="2600" b="1" dirty="0"/>
-              <a:t>OpenGL </a:t>
-            </a:r>
-            <a:r>
-              <a:rPr lang="en-CA" sz="2600" b="1" dirty="0" err="1"/>
-              <a:t>SuperBible</a:t>
-            </a:r>
-            <a:r>
-              <a:rPr lang="en-CA" sz="2600" b="1" dirty="0"/>
-              <a:t>: Comprehensive Tutorial and Reference</a:t>
-            </a:r>
-            <a:r>
-              <a:rPr lang="en-CA" sz="2600" dirty="0"/>
-              <a:t>, by Graham Sellers, Addison-Wesley Professional, either 6th or 7th edition:</a:t>
-            </a:r>
-          </a:p>
-          <a:p>
-            <a:pPr lvl="1"/>
-            <a:r>
-              <a:rPr lang="en-CA" sz="2200" dirty="0"/>
-              <a:t>6th Edition (July 21 2013), ISBN-10: 0321902947, ISBN-13: 978-0321902948</a:t>
-            </a:r>
-          </a:p>
-          <a:p>
-            <a:pPr lvl="1"/>
-            <a:r>
-              <a:rPr lang="en-CA" sz="2200" dirty="0"/>
-              <a:t>7th Edition (July 21, 2015), ISBN-10: 0672337479, ISBN-13: 978-0672337475 (OpenGL 4.5)</a:t>
-            </a:r>
-          </a:p>
-          <a:p>
-            <a:r>
-              <a:rPr lang="en-CA" sz="2600" b="1" dirty="0"/>
-              <a:t>Anton's OpenGL 4 Tutorials</a:t>
-            </a:r>
-            <a:r>
-              <a:rPr lang="en-CA" sz="2600" dirty="0"/>
-              <a:t>: </a:t>
-            </a:r>
-            <a:r>
-              <a:rPr lang="en-CA" sz="2600" dirty="0">
-                <a:hlinkClick r:id="rId3"/>
-              </a:rPr>
-              <a:t>http://antongerdelan.net/opengl/</a:t>
-            </a:r>
-            <a:r>
-              <a:rPr lang="en-CA" sz="2600" dirty="0"/>
-              <a:t> (which is now an e-book – the cheapest one for sure!)</a:t>
-            </a:r>
-          </a:p>
-          <a:p>
-            <a:r>
-              <a:rPr lang="en-CA" sz="2600" dirty="0"/>
-              <a:t>OpenGL Programming Guide: The Official Guide to Learning OpenGL</a:t>
-            </a:r>
-          </a:p>
-          <a:p>
-            <a:pPr lvl="1"/>
-            <a:r>
-              <a:rPr lang="en-CA" sz="2200" dirty="0"/>
-              <a:t>8th Edition (Mar 20, 2013), ISBN-10: 0321773039, ISBN-13: 978-0321773036   (OpenGL 4.4)</a:t>
-            </a:r>
-          </a:p>
-          <a:p>
-            <a:pPr lvl="1"/>
-            <a:r>
-              <a:rPr lang="en-CA" sz="2200" dirty="0"/>
-              <a:t>9</a:t>
-            </a:r>
-            <a:r>
-              <a:rPr lang="en-CA" sz="2200" baseline="30000" dirty="0"/>
-              <a:t>th</a:t>
-            </a:r>
-            <a:r>
-              <a:rPr lang="en-CA" sz="2200" dirty="0"/>
-              <a:t> Edition (July 8, 2016), ISBN-10: 0134495497, ISBN-13: 978-0134495491 (OpenGL 4.5)</a:t>
-            </a:r>
-          </a:p>
-        </p:txBody>
-      </p:sp>
-      <p:sp>
-        <p:nvSpPr>
-          <p:cNvPr id="4" name="AutoShape 6"/>
-          <p:cNvSpPr>
-            <a:spLocks noChangeArrowheads="1"/>
-          </p:cNvSpPr>
-          <p:nvPr/>
-        </p:nvSpPr>
-        <p:spPr bwMode="auto">
-          <a:xfrm>
-            <a:off x="8534400" y="4800600"/>
-            <a:ext cx="609600" cy="342900"/>
-          </a:xfrm>
-          <a:prstGeom prst="rightArrow">
-            <a:avLst>
-              <a:gd name="adj1" fmla="val 50000"/>
-              <a:gd name="adj2" fmla="val 33333"/>
-            </a:avLst>
-          </a:prstGeom>
-          <a:noFill/>
-          <a:ln w="19050">
-            <a:solidFill>
-              <a:srgbClr val="969696"/>
-            </a:solidFill>
-            <a:miter lim="800000"/>
-            <a:headEnd/>
-            <a:tailEnd/>
-          </a:ln>
-        </p:spPr>
-        <p:txBody>
-          <a:bodyPr wrap="none" anchor="ctr"/>
-          <a:lstStyle/>
-          <a:p>
-            <a:endParaRPr lang="en-CA"/>
-          </a:p>
-        </p:txBody>
-      </p:sp>
-      <p:sp>
-        <p:nvSpPr>
-          <p:cNvPr id="16386" name="AutoShape 2" descr="data:image/jpeg;base64,/9j/4AAQSkZJRgABAQAAAQABAAD/2wBDAAoHBwgHBgoICAgLCgoLDhgQDg0NDh0VFhEYIx8lJCIfIiEmKzcvJik0KSEiMEExNDk7Pj4+JS5ESUM8SDc9Pjv/2wBDAQoLCw4NDhwQEBw7KCIoOzs7Ozs7Ozs7Ozs7Ozs7Ozs7Ozs7Ozs7Ozs7Ozs7Ozs7Ozs7Ozs7Ozs7Ozs7Ozs7Ozv/wAARCAFZAQQDASIAAhEBAxEB/8QAHAAAAQUBAQEAAAAAAAAAAAAABAABAgMFBgcI/8QAURAAAQMCBAIFBA8CCgoDAQAAAQACAwQRBRIhMQZBEyJRYXEUgZKxBxYjMjQ2U3N0kaGywdHwQkMVJCYzRFJUYqLCFyVVZHKTlLPS4TVjgvH/xAAbAQACAwEBAQAAAAAAAAAAAAAAAwECBAUGB//EAC8RAAICAQIDBwMFAQEBAAAAAAABAgMRBCESEzEFFTJRUqHhFGJxIjM0QUKRYSP/2gAMAwEAAhEDEQA/AOYxzHMXhx/EYosVrWMZVSta1tQ8BoDjYAXQPtgxr/bFf/1L/wA03EHxjxP6ZL98qOEYTV41iMVDRR55ZD5gO09i7CUVHLQjO5P2wY1/tiv/AOpf+aXtgxr/AGxX/wDUv/NatdDgHDtU6kdTuxerj0lc6Qsha7mAG6nxuicLfwtxBUMoKnDjhFRL1Yqinmc5mbkHB11RyjjPDsBiQ8QY0ZmA4vXEZhvUv/NekMq6kxtJqJdv65Xn+PcN1nDWLspKsZg4h0cjdntuu6j/AJtngF5bt+b/AEuG34O92SovPEEeV1Hy8nplOaup+Xk9MqnsSXl+ZZ6n/wBO7y6/JF3ldR8vJ6ZS8rqPl5fTKpSRzLPNg4Q8kX+V1Hy8nplLyuo+Xk9Mqm4SsVHMs82HBX5Is8rqPl5PTKXldR8vL6ZVR3sraamkq52wwtzPcbKYytk8KTKyVUVlpCFXU/Ly+mU/lVQf38vplEzxUmHyGJzfKJm6O1s0FRjqqUvHTUbMvawkELRiafC57/kz8cccShsUeVT/AC8nplS8pn+Xk9Mqyvghgmb0Di6N7Q4X3WnhFJR1tHNJJTDNENw46qYQtlNw4yJ21xgp8JjmqqPl5PTKXlVR8vJ6ZUZntc8lkYYOwG6tAg8mzX6/ikOVmccT/wCj0oYT4fYh5XUfLSemUjVVHy8nplVX7kxKpzbPU/8Ao3lw8kXeV1Hy8nplLyuo+Xk9Mqm4SRzbPU/+hy4eSLvK6j5eT0ymNXUfLyemVUm1U82z1P8A6Ry4eSLvK6j5eT0ymNXUfLy+mVVdIlTzbPUyOXDyRb5XUfLyemU4qqn5eT0yqE6nm2ep/wDQdcPJF3ldR8vL6ZS8rqPl5fTKamgdVVDIWAlzzbwRuLYUcOe2xJjcN+wpiVzjxpvAmU6YzUWllhWFSPkpXF73OOci7jfkElHB/gj/AJw+oJL1Wibeng35HnNWkr5Y8zxviD4x4n9Ml++V6F7GFI2l4ZxjGwAZmB7GHmMrM34j6l57xBb2x4n3Vk33yvQ/YlxGCowrEsCkcA+QukaDzBaGn1Bd+3PLRz49Ty+Z7nyue43LiSSosc5rgWmxBuCisWoJcLxOoopmFskLy0g/YhYWPmlbGxpc9xAaBzKdlcJV9T1/i2NmM+xrhmLTC9RCInZuZvZrvzWthFDh9XhMs5icwxtsSXX5brm+OK+PCOEcH4aa4GoyxunaOQA2859S6PAyfa3WW/q/gvM65JyWVtudTT5UHh/2C09fRxzZX0UZhJsb3LvG6txvDGUT45qfWGbVo3sVkeZdJjErYcLw+KT34LXEdwH/APFwauG2MlNdDq2p02RcP7AamniwumhD4myzyjN19m+ZShp2YnQTSMibHNCL3ZoHDssj+I55YugmiDDE5lsxaDqsVuMVjInRse1rHbgNAVrOXXLhfQpUrLYcS6/kOwClo66V0csJLmtvmzXH1IeWopKKpdFFTMmDXWLn8z3Dki+FD/HJvm/xWJPrM8nfMVVyUKItLcYoOV0otvGDZxalpX4ZBX00fRZ9C0bK/hqBraKpq/2miw7tFCr+KVOf7/4lS4VqGOZPRudq8EgHwsnJQ5626oQ3L6dryZz8ji+VzjqXG6TWPd71rneAVlXA6mqpIXixY4jVEYRPJHiMDGvLWueAR2rmctyu4X5nT48U8UfIGkEuUdIHgAWGYbLf4b+A1v8Aw/gh+KJXDEBE1xEeQdXkiOG//j64/wB38FuorVeocTDdNz06k11wc6d0rpjurHRPZCyY2DXk5e+y5cotts6ilFJJkLqN0klRIYPdJMn0QAkktE11YgSSWiYqyAdOLKNk4Uf2Rg3aWrw+LCnPMDfKW9XTme1NhtZRy00ja9ocWXcC4nXuWJdNdbFrJLGxieii879Tdwx7ZIZXMaGtMpsByFgkoYN8Ed84fUEl6bRPOng//DgatYvkjxziHTiHFD21k33yhsPxCqwusiraOZ0U0Trtc39ahb+OcNYnUY5XzRQtLH1UjmkvA3cSgDwpiw/ct/5gXZWu03DwuSM30t3VRNfEeK8G4kY1+OYZLHWNbbyqjcOt4tKApMZwfBZvKcMoZp6lusctW4WYe3KNz4lD+1TFvkWf8wJDhTFr36Fv/MCX9XpF0mS9Lf6QKorqrEcRNZWTOlmleC5zjfn6l7bw65jeHat0jS5oGoBtcWXkUfC2KiRrnQsABB/nAvV8NrKGkwiWkkncXSt1IZtpZcnX6imc1wSXRmyimyMGmv7A2S0EUgkbHM8jUMcQAPPzVVZWS1s5mlNzyA2AVlJSw1FeyETXY472sSU1SI4TJC+mEcjXdU3O3evOS45RfkdmPBGS/thdLjTWUXkdZD08Q0FtwhZ6ihAPk1M4Ej3z3Xt5kRWYc9xpzBE1okiDt7Ak+KB8km6cwZCHt3G1kWStS4WskVwpb4k8BuE4rFhjnPELnvcLEl1h6kHNJDLOXsjLWk3LS7XzaJpqaWAML2iz/ekG4P1I3DaF0lW2OdjLEatc4XHmuqJ2zSg0Xaqg3Yn1JzYvBLhraA0zgxpuD0mt/qWXFK6GUSROLXNNwQUSae9PPIIXHI6wffQa9igMPqcrXmPKx+ziQAi3myafkFXJimvMKnxWOtY0VtPmkbs9hsfOo0tXRUk7Z2Qyve03Ac4AXQr6SeKcQOjOc6gDW6mcPqGxulszK02cc40KlWW5y1uiHXSlhS2ZLEa5+I1XTyNDTa1gjcOxmHD4JIm0zndIOsS/f7FlwgGZgIBBdrdE4rBFT1hihYGtaBsd1ELLFm3O5addbxV/QzpqEuzeTSeHSaepNXVrKromxRdEyJuUNvdRhoppmNcwAB5s27gLnuTRUNTM97I4yXM98OxRJ2yTSXUlRpjLOd0DlJEvoZ2QGbKCwGxLSDZKOgqJQzKADJ70FwBd4JCpnnGB7uh1yDWTq+ShnjZI8hpbHbMWuBsovppmU7Z3N9zcbA35odU11RKurfRlKSJdQTMje85T0er2hwuE0VFNKGEBozmzLutmPcpVM89COdXjOQdJEuoJxK6M5bsF3HMLN8SqpqeSDKX2LXi4c03BUuuSWWgVsJPCZWnTJJTGkkySZVJNvBvgb/nD6gklgvwN/wA4fUEl7PQ/xofg8lrP5E/yZFWP43N8671qm2qvqx/G5vnHetUleRtb5kvyz1NaXAvwNZMnTXVE2XwhJXSAT6KMvJJbBFJNJaI9douFqdKazCJTWN90hI6J7hYuPYsiPNnHRkh3KyvdDVv1c2Q21Fzt+gtlE3FPYxaiCk1l4DcUz56IXcQImgaK6oozNilQfdLMiDsrd36bLIzTOZnzEtad7p43VEj+o57nAaEONwEznb7oVyNtpG3dkVNhz5oxGxshLh/VHeq6ammZjxe5rizMXBw2IO2qyGRzTNuzM4A667J421EgLW5yI9bA7K7vy1sUWn4U9zQijeMLxAFjgc7eXeoVuf8AgmhaWkWzXFu9B5akOMYz3zZbX0uqi950LnG3IlUd22MF40ZfU3JHyMxLD3NZdxia3raeKprYZqKmqImxPMcj7l5AsEBSVZgmzSlz2lpG+re8KxlU2nilYyV8vSNy2cLAd6YrYSi87ZFcmUZJdcA1OC6dgAJOYaALRxinllxUhkbiHBtjbRZYJabg2I5hS6WT5R3pFY4WRUXFo3TrlKalE2KeiMD6V7W9Lmfcvv1Wa9ilG17K7ESGnWN2WyxM7gLZjbe1+aQkcNnEX313T/qIrojM9LNtts0qJjzhFaLO3bbTxRccM09NR1YjMhibo1hGttr9iwg94AAcbc9UdLVxTSxzF8kbmNAytF9uzVMpvg1llLtPJPb+y2Bsk1PXRZD0zrOyefVW+Su/geCJ5yOM/Wv+yD2rMqal1RUvntlLjyKpJJvcnVU+ogn0yWWmm11wb0NM6F1bE2MAdGQ1zjdz++6jT08tRQ0kojzuhccoYRcga6371hhzr3zG9rXujHVMVQ2HO58Tom5bNFwe8dibXqIMXZpppbbh0ckk7a6J7GtqZHB4a4b9yzqp9QI2RzMDGtJyiwFu1RrKs1VT0oBblADdddFQXOcbuJJ7SkXXJ/pRoooafE0MnTJ1iZuH5pin5plUk28F+Bv+cPqCSWC/A3/OH1BJez0P8aH4PJaz+RP8mTVn+NzfOO9aoKuq/hc3zrvWqF5C1f8A0l+T1NfgX4EkmS5XVEMHSTXSuUY/sgkz34ubDt7Fp+XQeUzyXuDHkj08ywq6ujw+ldUTAljd8o1WT7csNuepUegPzXQ01F8lmuOTDqJVN4m8HbvraF0uYNbl6Qut0fLLYDzlVitpWwueNJnxFpsz9orjDxlhw/d1HoD80x4yw75Oo9AfmtX02rf+DNxaZf7Oup5oY6J0RczO94JzA6AfiiYayhhhcwE2dkuMvIbriPbnh3ydR6I/NMOMsO+SqPRH5ojpdWukAlPTP/Z3Jr6clgc7qBz3FmTcm9kzKyhY8dS7QWkDLtYa/WVxHtzw4fuqj0R+ab26Yef3VR6I/NS9NrPQQp6b1nW1tRHO2IRtDcjbOsLak3Qi50cZYeTpFUeiPzS9ueHn91UeiPzSJ9naqbzwmmGr08Fw8R0SS50cZUG/RT+iPzS9uVB8lP8AUPzVO69V6S/1tHqOiS0XPe3KgP7mf6h+ab25UF/5mf6h+anuzU+kj66j1HRpFc6eMqEfuJ/qH5phxnQkfzE/1D80d2ar0h9dR6jo7pLnfblRfIT/AOH80vblRW/mJ9e4I7s1XpD66j1HRJhqudPGdFt0E31BIcZ0Q/o832IXZmq9IfXUeo6NJc37c6Mn4PN9if250d7dBN9it3ZqvSH11HqOjTrmzxlRj+jzfYn9udJ/ZpvsUPszVekn66j1HR2Ssuc9ulJ/ZpvrCY8aUn9nl+sKO69T6Q+uo9R3+C/A3/OH1BJVcOTipwoTtBAkdmAPgEl6HRxcdPFM89q2nfJo84xvjueixuvphRMcIaqRgdn3s4i+yAHsh1B/oEfplYPE+vFWL/T5/wDuOWaI+ZIA8VZ6Ol7uKJWsuSwmdkPZBqDcmhiAH98pm+yDUvd8Bi9MrjX62AsnjGtzZR9FR6Q+tv8AUdn7fqmxPkUPplI8fVQbm8hi9MrjtSbdnerADl5b6KPoqPSH1t3mdHifF9TiNEaZ1JEwPtqHHTVYXlEg/ZaqCLuvcKJve2m61VJUrENjNZZKx5kEmpkOtmqIqn3sQ1UuboNR9aYsNha1z3p/On5i8IJ8okt+ynE79+qhw0suHaKTW94+tHOn5hhBIleQdWhTaXEbtQ4bpuPrVrG3F7jdRzp+YYRe1pJ98FMQ3/aVbG2B1CIY21rkao50/MMIdlKLDrlWtoGk36Qp2NJOhFlewC46wRzp+YYRFmGxneVw8CFazBorfzr1axEx7DVHOn5k4QM3AYXHWaT7FezhumNj08v+H8kZH480TGLcwjnT8wwgJvC1I4j3eb6x+SIZwfQuteef6x+S0YraIyHRHOn5hwoy2cD4dJvUVH1j8kVF7HmFuIvUVXpN/JbMJ2WjTnZHNn5hhGFF7GeDvOtTV+ZzfyR8HsT4E8i9VW+Z7fyXQQFa9KdQjmz8wwjkm+w/gH9prvTb/wCKl/of4f8A7TXem3/xXetNwE6jmT8wwjgf9D/D9vhFb/zG/wDivOPZA4co+GMcjoqJ8r43Qh95SCbkns8F9CrxH2ZPjXB9Fb6ym1Tk202GNzqeD/i/D5vuhJLg74vQ+b7oSWGrwIfd42eJ8StHtqxcu/t89u/rlZZOZy1eJiRxVi/P+PT/AHysq/MBPEET28lKPVw0TEm1rJ4z1roAmAbkqTddzYAJOJA23SLzroLeCgBgetYAbq+SkkDmhnXLtersPOiqeiYGB7wHne3JX5iTo1rbdgQQASUE4aXaG3IJUTAZdR70c1qMlJOUgX8FU8Mje5waBrclAGRIT0rr9t07bXF07nF0rtBYknZJhPYEATBREYJFhzVbSb6WItqSFp4fD0gzEfYhkoto6HPHneSG35blEuogwHJmPbdxKKpeqzozYZe7cIrLfbQ9oUAZkUEUcl5hpfS+yiXB0jiBYE6AI6qjBp3gjYXuVmte7Q87IAJbuiI9whmOciY3G/8A6QSFRkIqNCMdoiYyoANiKNiOqAjJsjISRa6ANGErQgOoWbCdEfAdQgDWpzstWldqsenOy1KXfdAG1GbtCkqacXbdXWUgI7LxL2Yx/KuD6K37xXtp2XiXsxgniqn+it+8U6rxEM6jg/4vQ+b7oSTcHfF2DzfdCSyVeBD7v3GeKcSH+VWMDb+PT8v/ALCsxxIGh0PctPiY/wAqsXF/6dP/ANwrM1I322TxBAnvTsOtkhrbUqUfvtHbKALHEi1nbdqIpsrg4izpALtBCp0I3ub9ikHFtnBxB8EAbDdIG6207FFrspNyTfsCGp8RAAZNmP8AeAVkmIsAOQFx8LBRkC8Nu65NuwWQuIVALWxMcCSdSAqJauSUm7iB2NCGc5xcTckcrBACzWNy66k03IN9B3Ks5iDqVaw6AXI07FJBMO0y337lt4XKzo8ua5HcsaB0fSl0jnDTTTmioKjo8pEruqdyNSoJOka3UG5vvsrOme0EhubwuEBSVzZY9Xm6IdVMAvc2UEkK2WR0NnHK07tHNBRk6Xdr4J6ipM7g1pOQc1Ft82hN1JARGdb5vsRMbjff7EPDckC5V9QySmGWTM0k7qkppF1FsKabjTdWRTEENks0t3sgXyFkYDSbX7FZEXTNuDYHdJcpdRiS6B5xBkbuq0uHM7Ik4tEyEuj90eB7xhBP5LIDCTa+wN1CjqBheIx5j7lLo64271HMecFlDbKR09BirKiRsbmljnaW7D2LegNiLrnKPoZKq0cZz5y5z+wAWH4rfhOoKZVJy6lLUk9jVp3m9lqUpOnJY9O7W606Zx02TdhRu0rjaxRKBpZNgbI0bKcgOvEfZkP8q6f6K37xXty8Q9mT41U/0Vv3nJ1XVkM6jg7Xh2DzeoJJcG/F2DzeoJLJV4EaL/3GeJ8S5vbXi5H9un/7hWZd2ov4rS4nJ9tWL/Tp/vlZmtr3TzOOcwtunZe9gPFNfZJriHaFQBc27RfUJiXE7p3E5AL7hM3QIIJE21vqnJOlzooHTTtUgLm5Ng1ACJNr3solxAsL6DZImwAsnAvcoJEwGxJOg1Th2unYkSBzFkwAOt0EE26vsrRe3gVVYB26tBBbrzQBcx7stgTdXNe8n35Pbqh2ciNlcw2A8UAEMdYAA81ex1ze6HjO3irmboJCY3EKyV/Svgie46A7nQKlh0U3Rl4Dm2zt2uk2w4o7Da58LNF1M1lKBmzEbp6cxgFti0lD09W80/RSDKRvfmpMlABDRncdsjSsqjPCQ/MOpJhLJSDqCE1VJE2Rj+jErgMsbCd3JNpqiUi0du3MUbQ4S2OpbPKQ5zdhyCY6XJ7i1ZjobWGw9BTtzavdq89pWtCdlmwlHwlakklhCW2+pqU520WpTOHYsiA7LTpzspINulsbaBaA2WXSu2Wmw3Ckgc7LxL2ZB/Kmn+it+85e2rxP2ZPjTT/RW/eKbV1BnTcG/F2HzfdCSXBvxdh833QkslXgRov/AHGeLcTge2jFjY6V0/8A3CsgnSy2OI2GTivFmMBLjXT/APcKjS4U0APm1PZyWyuqVj2MkpqPUyhG92jWknuCuZSVBsRC8jwXRRthhbaOMfUnbPI112m3mW5aJf6Zneo8kc+6CRp68TwB2hQsLnqnQLsqfFQ1zWVFPDLEdHXYLqOMcOUlRB5Zhz2AO1yX1HclWaNpfpZMb03uckQA25BJ23TtFgbjW1080L6eTJJGWm/PmrI6d0o0bYH9olY+XLODRxLGQcAe+c3XxRUVG+SzmtIvzJWrh+BmSxazQftu1W/S4NTx6yAyO79AlW3007Te4JTn0ORGFlwAdJ9QU/4IbbqSHzhdlWeQUETS6CMlxsBb60T/AAVQ1MQc2PLmFwW6Ja7S0yX6ovBaWmuS4snn1Rh80NjkzDmW6qvKBlBHLa67StwiWlaZGe6Rjc8x4rDq8Ojm67AGv+wroRrrvjx0PKEcxweJoyWBx5aXVzGutsqnxuilyOYWkcu1TbcDnqszTTwx2U+gQwgaditYRa91S3caK1hHZdQSExkHYIqPbQd26FiIPLVEscOxVAKY0adVExWA2QkZ02uiI3Ackbkhke+2vii4jysgY3A8kZE4aaBG4BrCGi5ICJpaqCSQxMla54F8oK53Gq+ngoyx84Y5w0aDqVlYVV4vKT/BtM9z3Ns+V4v9XIJcrOHqSlk9LgkaLXIWpTvvqDyXlVRQ4qbvr62V5/qB1gPqWtw5xRJh7zQV8hdEdI5XbsPYe5VjqISlhEuLXU7ut4qocKcI3l0kpF8jBcrosHrJq6iZUTQ9CX6hl7kDv715XS5KnEJqmWz81XHECezdeu0jWsha1osBorVzcm//AAhrCL14n7Mnxqp/orfvFe2FeKezL8aKY/7q37xWurqVZ0vBvxdg/XIJJuDPi5B+uQSWSrwI0X/uM8vxambHxHish986tmP+Mqi9tOSOxwWx/Efpcv3ygCV6SqKjBYOLNtyYxOp70rEapJG6Yyo1+StZK5osHEDuVKWayq3gnBa5/SAZwHW7dVOkibPOGnRu5QheRdF4e/IXkHVYNbZwVNofVDMkma0tTJTsHQ0/SMHIGyHHEJabGm17M3/pWRTa96AxaSAytaxoDwLucF5NJTliSyd6hRb4WiNXXSVtR0jhYDRrb6BbOF43BDSMhnzhzdLgXFlzrWute2m10fhtJFW1bYZHFtwdQN1NlcJQw+iOjKEHDB1dPidFUNs2dmvJ2iysXoW0sgliHub9uwFaVLhVHT2ywhx7X6qzF4mvwyTTVliO5R2bquTqYxh0ZxdXXCUG0cjUU7J2kOGvbzCzXUkrHhoZ5wtm11G+Wy9vZp4279DixtlAqosOiyl9S/I1o1sLkppGU97MYQO8qZcbGx3CouU1UVpYwVdkm+o/R296bhWMta6qzG6uYdttVz9TplFcUDVVdl8LCIzoESwhUR9nVV7HWPJcw0hEbgNzYIKvxUxtMcJyvIHWRmTMwtuNQs3EJIxQdBUxkSxH3KVg98L+9P5pdjklsWRbhVBTSTNllZ0rydS83XpuCU0bqQMZG1rbWsBbkvNsLfq3usvTOGJWdHYkXt9n6suDqJSb3ZoiZ2OYOWtc7LouFxKgcSWAanQL2HGH0zaNxkc1otzXlGO10AlIiOZ19Lb3UUOTlsDxjcNwGmOehw2Nxkl6cTSu7LL2WlPVAK4LgnBRQUTaiZt6iXrOJ3Hcu7pSu9TDhjv1M8nlhS8U9mX4zUp/3Zv3iva14r7Mnxlpfow9ZWyrqVZ0fBnxcg/XIJJ+DPi5B+uQSWSrwI0X/uM82x0f6/xH6XL98rPtqtLHG/6+xG5/pcv3ygct7FemrX6UcSXVkLKJCuyqBGqvggqIsoOOqtIVbwLbbJMy0SlzzZWUc+SbKdA4Id538FXfW6wWx44tM0ReGmbhkytJAJPIBRpKFr5ekqDncTe19EBBWljQJG37CN1oQV0F9X28RZcGzT2w2SOhC5LozoIooZIhE6NuQi2W1ggXYe/D6yKphu6EO17WqdPX0waPd2jxRgxajY2xlzjsaLrFGnUZwosfDUqPVmxEM7rDVD8QO6GjELSC5+9uQWezH7vDaePL/ed+AWnPTiqw583vnAXOt10ezex5qxW27YOfqNUscMTkwbm1kzx1FKTR7gmOy9ljBzAcHqqFjcKQ537U7hbZAFfepsNiByTWTHcKk1lNFk8PIdHY26yujsOd0LE82ARMbivOTTjJo6cXsguIC24VeI0nlNKWt1dZSjd4IqM9qr1LHPUtW6jdklaWlp3IWzS8WGnaGwuJdsLaot1HBOLPjaVZT4LRtcHCMXWSekhN5LqbRnTYti2MOygvsebvyW1gPCrWTtqq0mSQG7Q7YLRpKaGEDJGB5lr05AsmV0Qr6FXJs1qUBgAGwFls0p2WJTkG2q16V4Wgg0V4r7Mvxlpfow9ZXtI2Xi3syke2Wk+jD1lOq6kM6Pgv4twfrkEkuC/i3B+uQSWSrwI0X/uM83xtw/h/Ee6rl++UGHJYxP8AylxVp5Vsw/xlVNdzXoqLMxRx7I7hF+5RcNlEPN05cT4LTlCsESFXILBXX5qt4zApU1ksgKQdQ9qCEhzEEaXWhIwkEBAyxFhJ/Z/Fc+1Y3Rpg0+pc0h1rKyM9m3NAxy5bAoxjhlNjruVEGmDTQbCr2dqHgOnmV4OnmW6tLBnkEwusQulwqrc6kmjcbjKVykbyAe1bGHz9HG4X3C0Ji2gKbSV3io6kKUpBldqq7qQKi2z9FIgX2Sd78W2Ujugkhl3UXC2qsJ0Vch6qh7ICyKZoFs2o5I2NwdqLkLJgJLi6+6NZUGIaG5715yzebOnDwo0mHLYE2uiozrusTpelcNSTfkd0dTPqc18hLB3qjiy2TXjJ0RsJ2WfFI2wOYi/IoyOVrRmc4ADmVXDZOTShOoWhA4DeyxJsQp6CAzVEoY0fb4LBk4zq53PFNS5YNg4nrFMhXKfQhySO4rMdpsOAaAZ53e9iZufFGcP8Svr619DV0hpp26gEmxHnXlhxOQVHTiRzJL7P98fOuwwSvE+O0EhF5ZG5TYcgU7lpfpwVzk9TYbsXjXsyj+UlIf8Adh94r2WK2QeC8a9mX4x0f0YfeKrT4izOi4L+LcH65BJLgv4twfrkElkq8CNF/wC4zx3HpCzirFzy8um++Uop7gXKhxHb2z4sO2umP+MoKKYsda+i6NNjic+yOTYDgU4PJBsmvfVWibmTZb42pozuIU3dK1ySqmzNS6QHnuruawQojHS/ahaiPO0juV0krWAuJQb6nPcNafFZbGmhqTTBspADjpYfWrIpCBY3USS7K0c1CQOBIOhGqyJtboc9zWp3g63+pE30KyqSXtOy0I5c42W+qzYzyiXA2CKimyjdCZrKdyALLTGQpoIzZie9Im9lU1xJA7E5dom5RXBK4uFI6nRUB9neCtz8+1CeSRjzVUx6p7lNz9ygppsz8o5LPqLVCDL1xyyyNxaQQEQDc2cbd9kFG5x2V2crhbt5Z0FjBoMcxjdbO5hacMrXUedpsR61gxlxcG237Ua2+bLG6wHvgTpdDWSQ0V3VJkYXAb2Q9RiTZnx9e0YsAOzv8UDiEoEVmmztkLR0755AGg5RsSm0QbllFJYwHVHTYnVNbmc4Ws0H9kLboMPkaGU7YgWk7OFh4qrDmRUbg4guLdbg7rWqMfnkiEcbGMAFiQ3ddWMeHoJzkxsZoGipMZLXW0u3YLQ4EmbBxNBFUkuGQthJ/ZPYhWU0tS45WlxPNXYLFk4qoIxo9st3X7lW1R4WyY9T26Bwybrx32ZteIaO2v8AF/8AMV6/SkFg05LyH2ZtOIKP6N/mK5lPiND/AKOg4L+LcH65BJNwV8WoP1yCSy1+Eff+4zxviQfynxbvr5/vlZobY3JK0+IdeKsWH+/T/fKzLCx71qj0Mj6ljZC0gX8VYJ7nZDkXHqUhraxTFJoq1kIE5PO5U3PlcOrpfmUOzQ3tp2q8SXDRvZXUmyrWCMo9zdrcnmqLFrueyIvm07VBwu6wCJLyBEIt2ErVbhzK2lke12SSNt2/3u5ZIBBbbQErdw82ZlHYm6eKlmLKWNrdGILxmxFrckTTS31B0UcQAfWSWAGVDxuLQB2JXgngv4o5NVjrgXV19EFE7qgX33RTTmGq2QkIki1hAKZz7MKYGylTvY6br6i1h4psmUS3M5tW4TOubtJ0RTam+525oGrpehqXMG17t8FGJr7nraLBz3BtM0utPdBslRdpy9iGaddd0wBDDruptYSPMstlrmxsIcKLWOyhXggnbzodjCdir8tst7fWljC9rrkuvrbRTY4NuQHE3VQBIOoRdNEbXc9rQdrndXSctkQ3gx6+Z3TWOovddFg7qWXDZXF2WRti0clmVmE1E8pdDF0gte7E9DQ1VK0ukbZvq8Vt00XB7i5tM6CljM0jYwNXm11ZVweTSdER1gNSnwjFqeg6z6cSyNN2uzKjFMWFVUPqJMrM2zRyW3O4vbAQ3ExTYfJCOqSb3R3A9JJX40cSlHViGWPTc9q5mljnxaqEbGno7/WvU+HcOZh1I1gFj4LDqbljhQyEWddSmwsvIvZn+MNH9H/zFes0p0C8m9mb4wUf0b/MVlqf6hjOg4J+LUH65BJLgn4tQfrkEllr8Jou8bPG+Jbe2fFiN/LpvvlZwIOvJaPEoHtnxa7h8On++VlsBaDdaIsyyRMkc9lJug8yhYONrqexAuOxMKjk9UDkpRg2GXkoP7ueiLp4rxjwV4LLKyeCtpLRfsTtuSNNVc6IgWspMiOcJ/CLyDvj6h0Wrh/82TzsgZW7tGiIw6ZjGZXutyuUyrEZFZ7oHkZed7iN3IeoYGWAIF0VNK1kzySLAoSaYSZQBoNtNUm3BeGS+AAt312RTHC1roGI5eaLYdNVetkSRY5wY0knYXQUNS5ktnX1KlVS6hgttqqGgONrjVKtuansXhWnHc0p2NqYQ5gu9m3eFntIzWyjRTgmkgfvdo7EV0MdWM0RDX7kXsomlb+pdSYtw2YKLBp0B1UrggjTbU2SLcrrG2mhTt5+91Cx4HFkZFvejQWVodvoL2VbSLGxarGu3PVUEifNlaLAX5KMc1QXaAmysYA52w8CFt0VPHG0Etbfmhy4QxkzY8YxGlkJgJjLm5XWG4TsrMRqI3NDAARbRu66CGmgkeSWNWhT0sLNmNtzQtTOPQngRxsVHiLnZWh2q1aThXEJ2dLIXEt1suvgpwQMrW/UtON4bFobFUlqrGCrQDgeGUtLE18QuS0E3Gt109MdBYrKijbG/qixdqVo0/LdTnbJJt0pOmpXlPsyC+P0X0f/ADFepUptYWJXlvsxOvj9Hp/RvxKfT1Ks6Hgn4tQfrkEkuCfi1B4/gElmr8I+7xs8b4n+M2KfT5/vlZ1uvfuWjxMSeKMU1/p0/wB8rOjN32O4T11MzCBTOLL6DRVublfbmFrQtHQtuL6LNqj/ABl3LktllfDFMRGWXgpvd4FgtemZ7mPBZDGgvB5k6LdhbaNtuxX0yyytrwiD49LpNYNFY9twk0WIWxx3E5M+ukyODW7ndUsq5Y4jEA0tcb6jUIippJZqlzgQBss9zXNcWu3aVz7XKMsmiOGiT3Fzus5Ra43TE3fryS0CS3kuFNGXzq9rjbMTtqhWkB453VkjyI7DW5Tk8RyVayykvL5ie1OzNcGygHG5F7KxhLQNdVjbzuPWxJjztpYaKynlEDycrX5hYg7KDXhzeV/BNc2Hb4KYycegNJ9S0vLrmwCYH7VBpJ0TPfY9gsqgXtN+qrGWNygmTFvO4REcosbggowSFxGxaStunkaNzusFkjerqVq08FXK33KmmffYhhVZLIZNume1xDWAud2AXWg1krG9eJzB/eFkFhnD+MVFx5PNTtcLdK45bI+owOroJA3yzyghmrGlzRbt1Oqo4bE5CYqxsbbXtYbqEeIyHqho99qT9izZhJCWtcx0fYS0jVHgRRQkk2cQCCUvhBs3KWUyNBJubalalOdli0GkTSDutimOydFbAbFKdF5f7MH/AM5RfR/8xXptM/bXdeZey6b45Qnsgv8A4lop6kM6LgoW4ag8fwCSbgk5uGoCe38AkstfhHW+NnjnEg/lPip5eXTn/GVnxi0hLhutPiUW4kxRwJt5dP8AX0hWYLlx1ub6rRHqZpdDbj1iFhyWXVa1Ug5grTgPuLfBZdV8Ilt2roX+BGavxFcYPTDsW8wXYLdiwoATM0d66GEHKFbSIi4g4aBOBYgJ3ixSA7exbX1EFehJKyawBtU761pxOzMJ8UBiDAJ2v5ELFqN4Dq/EBAAuN1LI7cNJHbZSA5LVw05ogLbXWaqvjlgdOXCjPggmkdox1+22iMr6boaOMD3wOq1G2A8UPXtLqV5G4C2S06jWxKszJGARYetTbc6apHQG197p43Ovq7ULjm0TdGWATi5A7k7bl2+iVnXAv3oAgSWu5qDg7Pzsrz1xY9qi9paQVIBmFYMcREs81Q2npISA95GYknYNHNGOi4XhaW9PiEp7QGN/NEcFVFI6vdh9e4CKpBbmPIkWBWLieGz4ViU9HUxlr4nZdeY5EfYqqW5ODveAcEwfFcdjqaGOqLaTrOMzha57LBetywwQkZWj3pvlbv3rkvYsw2Oj4ZZLmaJZnZjcahdnWm9MXZrnlbl/6VlLchoxYm9JP0bsxa11hYaFXGmYa0uMRN2b8k1Gx2cyAgE3N+QQmI4jJR4o61IHsjZrewc8/wB26bKUUtyuHnY1aajg6EtMQuD/AFQT5u1B8SYRBWYZma1jHR2uQ2xtdEcPYg3EaJ8zGGIZj1XNsRz1HLRaUpzxPaXixaRci/JKm01sWSa6nCwN6MBuwAsEfLUGioHVDWB8pNo2H9oqDaMuqX5Seja/KTbW/h+KhPUMqMThoWtDo6YZy4a6+KXl4L/2G4PhrYXeUVTzNUu1LnG4b3NHYuE9lw/65otf3H+Zej0xF15t7LJH8MUXzB9afT1Ks6bgj4sweP4BJNwP8WYPH8Aks1fhHW+NnkXEjQ7iXFASR/HpvvlZgGh8bLpuIMOkdjuIuDCc9ZKb/wD7Kw6mmlhDrxm3bZOhZFyEyg0gynI6BtuxZ1XYVUgPI6IujkAhAcQLHmhawNdVOIN9lvskpVoyRWJMhSj3VpPaunpoyYQVzcRDZ2DkCulhnbFA1lr6LRpOgu7qVVDLPKrddsZ7momqcDYaIWXM6Bwbq4iwstVjSTYqKy0gGjfeEpq5t4Wu5tKphMlO1zXxuBvpopvqMzCwsOo1XN50HBps08uSl0AL+6fYtPCiRmBWc0bHv+pGUD8s+XkQqUSxYmXmsxNga2UpYTNCYha7xbVRYbkXU81pB4rqWvNbx5GStfrSKPabip2ENuXXTt4MxUcoAf8AjXeQHNAx3a0K22i+eWdpWxk0ezr7OqcUzgW8HYqAb9Df/jUvafieb9z6a7yyVlTvO0v3bUcE7g/Em6jordz0LPw3iELDnY0+BXo9h2JnRteLFoIUx7UszuVl2bW1seTOo6imkuW5XX0IK34sYpMZoWUeOsd0sQyxVkfvmjsPaF09dgkFS0lrbOK5mv4emhzZGnKF0adfCzrszm3aGdfToei8N8RxYbhcML+kEeXqHIHN+zdaOJcaUzqM5Y2lzbWDwW38NCvIY56qlYInZhbYjcKTKyaTPEZ3C2rdL3WxTb6GRxx1PR6bjSnpix0kEZcbAgvu4ADUgEaqdBXw41if8KSTSAGXKBmLWtABt1b9nLvXm0MQqwBLOxjr2BlJaB3nQrRkkmw+gfA3E6d8bHZwIZM2vjb8UycJSjgomkz0SDHqTBMRqYnBmR7nnM03O/K23nPJFjjSj6DLdxfzyRXse/XXzLyPyiR8OZ0pY52o0vfzovDqWqrZQwSOdGBqb2AWWU3TH9Q6MeZLETpa/GsQnqHeQiQNnc6+Y3aCAN+z60dgobh8JM73SzyHNI63Ps8ENTU7KaBsTNgrVxrO0rOL9PQ7VXZ0OHMzeixumZu1/mXGceU1RxBiFNNQxXbHEWHO4DW61SolEO1bovJd9nVNGnwdBJTYBHDKAHsdYgHuCSLwL4E/5w+oJLuaWbnTGT/s4upio3SijIraGB9TM4xjMZnEnzrOqsGpp2ZSwA9q2qn+el+dd60M4C681ZbOM20z0cKYSgso5KfhGPNdlvqWDi/DlXRObKyJz47aka2XpBTZQn09pWwazuhFnZ1UltsePs0mbvodbrbY7qjrDZdnX4Bh1e7PNTgP/rs6p+xCt4Tw4WBMzgNrvXd0/bdUVumce7sixvZnNSPuwElHYHCKnEY2aOa0FxC3ouFcOPvYJHgdrnH1I2lwykoLinp2xE6Hcn7UavtuFlTjBdSdP2TKFilJ9AGq4fpagkhtiUBJwnETdq6a2ninawkEhpsN+5ebhq7k8JncnpaXu0cJV8F1QcXUr2EH9lxtZZ0uB4pRTtkkpXlo5sGYfYvTAw5rW17E7mFps5pB7CFuq7Wug8tZMdnZlUuh56yOpcbNppif+Aq5lBiD5BlopbHmW2XemJ4bcscBvso2t5uxbJ9v3YwoiIdj15zxFFNG5lNE14s4NFwrgEsp3UgvOTk5ycjtwSjFIZJTEcjm5msJHaAk2N7rWYTfsCOFkuSIWTWUnMc0jM0i4uL805jeHAOaQTsLbqMMOJEbKL42uFnC6mRa4IsQlbVG6J2a3M+fCaebXJ9iCk4cgebgWK3bG9hv2KZie0kFhuN9E6Gotj0ZnnRU+qObfw6XgNdI9zQLAE6AJm8NMAADiO8FdDbuCcjwTfr78dRf0VPkYkfD1KHh0jS8jtK1IaeOBgZGwNHYArvNZMs87p2eJj69PXDoiKSdMkmgRTc06SAwbmB/An/OH1BJPgnwN/zh9QSXr9F/Hh+Dyes/kS/IFUgdLN8471oV+6MqR15tP3p9aEfuvMX7TZ6ajeCK7JrWT80QIac290tfv2SowbWwyUuHqDJtUQ+KJrmhslwTrqnbDE4XMgZ3XurcuRTmIsoALThwOXIPe+PJFNhZNUPe/I5jnWB7rboNsEOYXmBHPl+Pcn6CEaicH9bLTGWEkzLKGXlMuhihLYmOjAzRuLib3BF7KYYyOOVsbQWOhGV3MnS/2oYwQkn3cafrtTCKPM4GUWsLO/RRx4fQq689WKoaG1nV0GhGqetaTUzSbtDrbp42RxyuDn3sNOV+1O6CA5nCqBuDY23VGsxZfOJIJJZ5MGZvdDAAcx0IvrbvVbo4A+QOjaWtcOjsffKmNkDrF0gBIuR2FTFPS5jmqQRryTeJvqhXAo5w2TlbG2OdrA05g0t0sQNUIwxCFzXMJkJ6rr7K3yanJ0qc3ZZut/160z6Zkc5YX3aGk38yXPLeRsMJbthFA5raVt/lgdTa2m6kwNEkThy6QF3boQFR0FLkt02uawPdqoCOn6Qgy3aW3Duwq6k0sC3BNtj1liKe3KIA/WfzV0jM9bE42LWtZc3+tUCOn8oc0v8AcuRB7lIQ0xP8+RzsBoqpt5ZfCSSLJmRtGaNrT1yJL7gclN8MRmysEeW5LXEixFtvHxVIp6UE3qDpbW1gU5ipesOlNj70+fZWzj+ijWf7GqmQsqDkPYWhouO/XkiqtsU046J7GWcM4cdD3oSCKAseJXhrv2TdTbDRhwzTlw7hpuoi3vt1CUem72LnQwseDljcejdmGmh1tsoCOBzM1mCQxAgaAXvr3bKvoaS9zPcG/mP6Kg5lMJMrXggMNiTzVs4/pEKL82Dy5ekdlGUX2veyhujBFS5tZBYjlyOiYw0t9JzbwWZ1tvJrVqWwGU1kaYKP5Y6DlzVdSyG94XAjmLqjraWS0bE3gGCeycJJQ428F+Bu+cPqCSWDfA3fOH1BJew0X8eH4PJ6z+RP8g1QNZT/APafWgnDVdMksVnZXG88ft8m2vtPgWOD3+DlrJbLqUkvuj7/AG+Rj7Wz/j3+DlbJ9F1KSO5/v9vkjvb7Pf4OWS5LqUkd0ff7fId6/Z7/AActZSHMLp0lPdH3+3yR3r9nv8HMIwvo3k3YRvay20lePZbiscft8lJdpKW/B7/Bhz+ShjmRC5/ZP1JxJRlgDmOvpcju7FtpK3dv3e3yU+vXp9/gwi6iNzld3C1uX5qkiASu3LLGwtsV0aSh9mN/79vkldoJf59/g51xpsrsrTc3A/BWtmpQBeI30ubb6H/0t1JHdr9ft8g+0E/8e/wYE0lM4ExscCTpfkpdNTOZrDr9h0/P1rdSQuzGv9+3yHeEfR7/AAYpnpLW6JxsOz/2qpHUzmO6NhDr6Fb6SH2Y3/v2+QXaCTzw+/wcyd0l0ySV3R9/t8ju9fs9/g5i2iVl06SO6Pv9vkO9fs9/g5dJdQkjuf7/AG+SO9fs9/g5a101l1SSjuf7/b5J72+z3+DlbJWXVJI7m+/2+Se9vs9/gz8G+CO+cPqCS0El2KKuVWoZzg5N1nNsc8Yyf//Z"/>
-          <p:cNvSpPr>
-            <a:spLocks noChangeAspect="1" noChangeArrowheads="1"/>
-          </p:cNvSpPr>
-          <p:nvPr/>
-        </p:nvSpPr>
-        <p:spPr bwMode="auto">
-          <a:xfrm>
-            <a:off x="155575" y="-136525"/>
-            <a:ext cx="298450" cy="298450"/>
-          </a:xfrm>
-          <a:prstGeom prst="rect">
-            <a:avLst/>
-          </a:prstGeom>
-          <a:noFill/>
-        </p:spPr>
-        <p:txBody>
-          <a:bodyPr vert="horz" wrap="square" lIns="91440" tIns="45720" rIns="91440" bIns="45720" numCol="1" anchor="t" anchorCtr="0" compatLnSpc="1">
-            <a:prstTxWarp prst="textNoShape">
-              <a:avLst/>
-            </a:prstTxWarp>
-          </a:bodyPr>
-          <a:lstStyle/>
-          <a:p>
-            <a:endParaRPr lang="en-CA"/>
-          </a:p>
-        </p:txBody>
-      </p:sp>
-    </p:spTree>
-  </p:cSld>
-  <p:clrMapOvr>
-    <a:masterClrMapping/>
-  </p:clrMapOvr>
-  <p:timing>
-    <p:tnLst>
-      <p:par>
-        <p:cTn id="1" dur="indefinite" restart="never" nodeType="tmRoot">
-          <p:childTnLst>
-            <p:seq concurrent="1" nextAc="seek">
-              <p:cTn id="2" dur="indefinite" nodeType="mainSeq">
-                <p:childTnLst>
-                  <p:par>
-                    <p:cTn id="3" fill="hold">
-                      <p:stCondLst>
-                        <p:cond delay="indefinite"/>
-                      </p:stCondLst>
-                      <p:childTnLst>
-                        <p:par>
-                          <p:cTn id="4" fill="hold">
-                            <p:stCondLst>
-                              <p:cond delay="0"/>
-                            </p:stCondLst>
-                            <p:childTnLst>
-                              <p:par>
-                                <p:cTn id="5" presetID="5" presetClass="entr" presetSubtype="10" fill="hold" grpId="0" nodeType="clickEffect">
-                                  <p:stCondLst>
-                                    <p:cond delay="0"/>
-                                  </p:stCondLst>
-                                  <p:childTnLst>
-                                    <p:set>
-                                      <p:cBhvr>
-                                        <p:cTn id="6" dur="1" fill="hold">
-                                          <p:stCondLst>
-                                            <p:cond delay="0"/>
-                                          </p:stCondLst>
-                                        </p:cTn>
-                                        <p:tgtEl>
-                                          <p:spTgt spid="3">
-                                            <p:txEl>
-                                              <p:pRg st="0" end="0"/>
-                                            </p:txEl>
-                                          </p:spTgt>
-                                        </p:tgtEl>
-                                        <p:attrNameLst>
-                                          <p:attrName>style.visibility</p:attrName>
-                                        </p:attrNameLst>
-                                      </p:cBhvr>
-                                      <p:to>
-                                        <p:strVal val="visible"/>
-                                      </p:to>
-                                    </p:set>
-                                    <p:animEffect transition="in" filter="checkerboard(across)">
-                                      <p:cBhvr>
-                                        <p:cTn id="7" dur="500"/>
-                                        <p:tgtEl>
-                                          <p:spTgt spid="3">
-                                            <p:txEl>
-                                              <p:pRg st="0" end="0"/>
-                                            </p:txEl>
-                                          </p:spTgt>
-                                        </p:tgtEl>
-                                      </p:cBhvr>
-                                    </p:animEffect>
-                                  </p:childTnLst>
-                                </p:cTn>
-                              </p:par>
-                            </p:childTnLst>
-                          </p:cTn>
-                        </p:par>
-                      </p:childTnLst>
-                    </p:cTn>
-                  </p:par>
-                  <p:par>
-                    <p:cTn id="8" fill="hold">
-                      <p:stCondLst>
-                        <p:cond delay="indefinite"/>
-                      </p:stCondLst>
-                      <p:childTnLst>
-                        <p:par>
-                          <p:cTn id="9" fill="hold">
-                            <p:stCondLst>
-                              <p:cond delay="0"/>
-                            </p:stCondLst>
-                            <p:childTnLst>
-                              <p:par>
-                                <p:cTn id="10" presetID="5" presetClass="entr" presetSubtype="10" fill="hold" grpId="0" nodeType="clickEffect">
-                                  <p:stCondLst>
-                                    <p:cond delay="0"/>
-                                  </p:stCondLst>
-                                  <p:childTnLst>
-                                    <p:set>
-                                      <p:cBhvr>
-                                        <p:cTn id="11" dur="1" fill="hold">
-                                          <p:stCondLst>
-                                            <p:cond delay="0"/>
-                                          </p:stCondLst>
-                                        </p:cTn>
-                                        <p:tgtEl>
-                                          <p:spTgt spid="3">
-                                            <p:txEl>
-                                              <p:pRg st="1" end="1"/>
-                                            </p:txEl>
-                                          </p:spTgt>
-                                        </p:tgtEl>
-                                        <p:attrNameLst>
-                                          <p:attrName>style.visibility</p:attrName>
-                                        </p:attrNameLst>
-                                      </p:cBhvr>
-                                      <p:to>
-                                        <p:strVal val="visible"/>
-                                      </p:to>
-                                    </p:set>
-                                    <p:animEffect transition="in" filter="checkerboard(across)">
-                                      <p:cBhvr>
-                                        <p:cTn id="12" dur="500"/>
-                                        <p:tgtEl>
-                                          <p:spTgt spid="3">
-                                            <p:txEl>
-                                              <p:pRg st="1" end="1"/>
-                                            </p:txEl>
-                                          </p:spTgt>
-                                        </p:tgtEl>
-                                      </p:cBhvr>
-                                    </p:animEffect>
-                                  </p:childTnLst>
-                                </p:cTn>
-                              </p:par>
-                              <p:par>
-                                <p:cTn id="13" presetID="5" presetClass="entr" presetSubtype="10" fill="hold" grpId="0" nodeType="withEffect">
-                                  <p:stCondLst>
-                                    <p:cond delay="0"/>
-                                  </p:stCondLst>
-                                  <p:childTnLst>
-                                    <p:set>
-                                      <p:cBhvr>
-                                        <p:cTn id="14" dur="1" fill="hold">
-                                          <p:stCondLst>
-                                            <p:cond delay="0"/>
-                                          </p:stCondLst>
-                                        </p:cTn>
-                                        <p:tgtEl>
-                                          <p:spTgt spid="3">
-                                            <p:txEl>
-                                              <p:pRg st="2" end="2"/>
-                                            </p:txEl>
-                                          </p:spTgt>
-                                        </p:tgtEl>
-                                        <p:attrNameLst>
-                                          <p:attrName>style.visibility</p:attrName>
-                                        </p:attrNameLst>
-                                      </p:cBhvr>
-                                      <p:to>
-                                        <p:strVal val="visible"/>
-                                      </p:to>
-                                    </p:set>
-                                    <p:animEffect transition="in" filter="checkerboard(across)">
-                                      <p:cBhvr>
-                                        <p:cTn id="15" dur="500"/>
-                                        <p:tgtEl>
-                                          <p:spTgt spid="3">
-                                            <p:txEl>
-                                              <p:pRg st="2" end="2"/>
-                                            </p:txEl>
-                                          </p:spTgt>
-                                        </p:tgtEl>
-                                      </p:cBhvr>
-                                    </p:animEffect>
-                                  </p:childTnLst>
-                                </p:cTn>
-                              </p:par>
-                              <p:par>
-                                <p:cTn id="16" presetID="5" presetClass="entr" presetSubtype="10" fill="hold" grpId="0" nodeType="withEffect">
-                                  <p:stCondLst>
-                                    <p:cond delay="0"/>
-                                  </p:stCondLst>
-                                  <p:childTnLst>
-                                    <p:set>
-                                      <p:cBhvr>
-                                        <p:cTn id="17" dur="1" fill="hold">
-                                          <p:stCondLst>
-                                            <p:cond delay="0"/>
-                                          </p:stCondLst>
-                                        </p:cTn>
-                                        <p:tgtEl>
-                                          <p:spTgt spid="3">
-                                            <p:txEl>
-                                              <p:pRg st="3" end="3"/>
-                                            </p:txEl>
-                                          </p:spTgt>
-                                        </p:tgtEl>
-                                        <p:attrNameLst>
-                                          <p:attrName>style.visibility</p:attrName>
-                                        </p:attrNameLst>
-                                      </p:cBhvr>
-                                      <p:to>
-                                        <p:strVal val="visible"/>
-                                      </p:to>
-                                    </p:set>
-                                    <p:animEffect transition="in" filter="checkerboard(across)">
-                                      <p:cBhvr>
-                                        <p:cTn id="18" dur="500"/>
-                                        <p:tgtEl>
-                                          <p:spTgt spid="3">
-                                            <p:txEl>
-                                              <p:pRg st="3" end="3"/>
-                                            </p:txEl>
-                                          </p:spTgt>
-                                        </p:tgtEl>
-                                      </p:cBhvr>
-                                    </p:animEffect>
-                                  </p:childTnLst>
-                                </p:cTn>
-                              </p:par>
-                            </p:childTnLst>
-                          </p:cTn>
-                        </p:par>
-                      </p:childTnLst>
-                    </p:cTn>
-                  </p:par>
-                  <p:par>
-                    <p:cTn id="19" fill="hold">
-                      <p:stCondLst>
-                        <p:cond delay="indefinite"/>
-                      </p:stCondLst>
-                      <p:childTnLst>
-                        <p:par>
-                          <p:cTn id="20" fill="hold">
-                            <p:stCondLst>
-                              <p:cond delay="0"/>
-                            </p:stCondLst>
-                            <p:childTnLst>
-                              <p:par>
-                                <p:cTn id="21" presetID="5" presetClass="entr" presetSubtype="10" fill="hold" grpId="0" nodeType="clickEffect">
-                                  <p:stCondLst>
-                                    <p:cond delay="0"/>
-                                  </p:stCondLst>
-                                  <p:childTnLst>
-                                    <p:set>
-                                      <p:cBhvr>
-                                        <p:cTn id="22" dur="1" fill="hold">
-                                          <p:stCondLst>
-                                            <p:cond delay="0"/>
-                                          </p:stCondLst>
-                                        </p:cTn>
-                                        <p:tgtEl>
-                                          <p:spTgt spid="3">
-                                            <p:txEl>
-                                              <p:pRg st="4" end="4"/>
-                                            </p:txEl>
-                                          </p:spTgt>
-                                        </p:tgtEl>
-                                        <p:attrNameLst>
-                                          <p:attrName>style.visibility</p:attrName>
-                                        </p:attrNameLst>
-                                      </p:cBhvr>
-                                      <p:to>
-                                        <p:strVal val="visible"/>
-                                      </p:to>
-                                    </p:set>
-                                    <p:animEffect transition="in" filter="checkerboard(across)">
-                                      <p:cBhvr>
-                                        <p:cTn id="23" dur="500"/>
-                                        <p:tgtEl>
-                                          <p:spTgt spid="3">
-                                            <p:txEl>
-                                              <p:pRg st="4" end="4"/>
-                                            </p:txEl>
-                                          </p:spTgt>
-                                        </p:tgtEl>
-                                      </p:cBhvr>
-                                    </p:animEffect>
-                                  </p:childTnLst>
-                                </p:cTn>
-                              </p:par>
-                            </p:childTnLst>
-                          </p:cTn>
-                        </p:par>
-                      </p:childTnLst>
-                    </p:cTn>
-                  </p:par>
-                  <p:par>
-                    <p:cTn id="24" fill="hold">
-                      <p:stCondLst>
-                        <p:cond delay="indefinite"/>
-                      </p:stCondLst>
-                      <p:childTnLst>
-                        <p:par>
-                          <p:cTn id="25" fill="hold">
-                            <p:stCondLst>
-                              <p:cond delay="0"/>
-                            </p:stCondLst>
-                            <p:childTnLst>
-                              <p:par>
-                                <p:cTn id="26" presetID="5" presetClass="entr" presetSubtype="10" fill="hold" grpId="0" nodeType="clickEffect">
-                                  <p:stCondLst>
-                                    <p:cond delay="0"/>
-                                  </p:stCondLst>
-                                  <p:childTnLst>
-                                    <p:set>
-                                      <p:cBhvr>
-                                        <p:cTn id="27" dur="1" fill="hold">
-                                          <p:stCondLst>
-                                            <p:cond delay="0"/>
-                                          </p:stCondLst>
-                                        </p:cTn>
-                                        <p:tgtEl>
-                                          <p:spTgt spid="3">
-                                            <p:txEl>
-                                              <p:pRg st="5" end="5"/>
-                                            </p:txEl>
-                                          </p:spTgt>
-                                        </p:tgtEl>
-                                        <p:attrNameLst>
-                                          <p:attrName>style.visibility</p:attrName>
-                                        </p:attrNameLst>
-                                      </p:cBhvr>
-                                      <p:to>
-                                        <p:strVal val="visible"/>
-                                      </p:to>
-                                    </p:set>
-                                    <p:animEffect transition="in" filter="checkerboard(across)">
-                                      <p:cBhvr>
-                                        <p:cTn id="28" dur="500"/>
-                                        <p:tgtEl>
-                                          <p:spTgt spid="3">
-                                            <p:txEl>
-                                              <p:pRg st="5" end="5"/>
-                                            </p:txEl>
-                                          </p:spTgt>
-                                        </p:tgtEl>
-                                      </p:cBhvr>
-                                    </p:animEffect>
-                                  </p:childTnLst>
-                                </p:cTn>
-                              </p:par>
-                              <p:par>
-                                <p:cTn id="29" presetID="5" presetClass="entr" presetSubtype="10" fill="hold" grpId="0" nodeType="withEffect">
-                                  <p:stCondLst>
-                                    <p:cond delay="0"/>
-                                  </p:stCondLst>
-                                  <p:childTnLst>
-                                    <p:set>
-                                      <p:cBhvr>
-                                        <p:cTn id="30" dur="1" fill="hold">
-                                          <p:stCondLst>
-                                            <p:cond delay="0"/>
-                                          </p:stCondLst>
-                                        </p:cTn>
-                                        <p:tgtEl>
-                                          <p:spTgt spid="3">
-                                            <p:txEl>
-                                              <p:pRg st="6" end="6"/>
-                                            </p:txEl>
-                                          </p:spTgt>
-                                        </p:tgtEl>
-                                        <p:attrNameLst>
-                                          <p:attrName>style.visibility</p:attrName>
-                                        </p:attrNameLst>
-                                      </p:cBhvr>
-                                      <p:to>
-                                        <p:strVal val="visible"/>
-                                      </p:to>
-                                    </p:set>
-                                    <p:animEffect transition="in" filter="checkerboard(across)">
-                                      <p:cBhvr>
-                                        <p:cTn id="31" dur="500"/>
-                                        <p:tgtEl>
-                                          <p:spTgt spid="3">
-                                            <p:txEl>
-                                              <p:pRg st="6" end="6"/>
-                                            </p:txEl>
-                                          </p:spTgt>
-                                        </p:tgtEl>
-                                      </p:cBhvr>
-                                    </p:animEffect>
-                                  </p:childTnLst>
-                                </p:cTn>
-                              </p:par>
-                              <p:par>
-                                <p:cTn id="32" presetID="5" presetClass="entr" presetSubtype="10" fill="hold" grpId="0" nodeType="withEffect">
-                                  <p:stCondLst>
-                                    <p:cond delay="0"/>
-                                  </p:stCondLst>
-                                  <p:childTnLst>
-                                    <p:set>
-                                      <p:cBhvr>
-                                        <p:cTn id="33" dur="1" fill="hold">
-                                          <p:stCondLst>
-                                            <p:cond delay="0"/>
-                                          </p:stCondLst>
-                                        </p:cTn>
-                                        <p:tgtEl>
-                                          <p:spTgt spid="3">
-                                            <p:txEl>
-                                              <p:pRg st="7" end="7"/>
-                                            </p:txEl>
-                                          </p:spTgt>
-                                        </p:tgtEl>
-                                        <p:attrNameLst>
-                                          <p:attrName>style.visibility</p:attrName>
-                                        </p:attrNameLst>
-                                      </p:cBhvr>
-                                      <p:to>
-                                        <p:strVal val="visible"/>
-                                      </p:to>
-                                    </p:set>
-                                    <p:animEffect transition="in" filter="checkerboard(across)">
-                                      <p:cBhvr>
-                                        <p:cTn id="34" dur="500"/>
-                                        <p:tgtEl>
-                                          <p:spTgt spid="3">
-                                            <p:txEl>
-                                              <p:pRg st="7" end="7"/>
-                                            </p:txEl>
-                                          </p:spTgt>
-                                        </p:tgtEl>
-                                      </p:cBhvr>
-                                    </p:animEffect>
-                                  </p:childTnLst>
-                                </p:cTn>
-                              </p:par>
-                            </p:childTnLst>
-                          </p:cTn>
-                        </p:par>
-                      </p:childTnLst>
-                    </p:cTn>
-                  </p:par>
-                  <p:par>
-                    <p:cTn id="35" fill="hold">
-                      <p:stCondLst>
-                        <p:cond delay="indefinite"/>
-                      </p:stCondLst>
-                      <p:childTnLst>
-                        <p:par>
-                          <p:cTn id="36" fill="hold">
-                            <p:stCondLst>
-                              <p:cond delay="0"/>
-                            </p:stCondLst>
-                            <p:childTnLst>
-                              <p:par>
-                                <p:cTn id="37" presetID="10" presetClass="entr" presetSubtype="0" fill="hold" grpId="0" nodeType="clickEffect">
-                                  <p:stCondLst>
-                                    <p:cond delay="0"/>
-                                  </p:stCondLst>
-                                  <p:childTnLst>
-                                    <p:set>
-                                      <p:cBhvr>
-                                        <p:cTn id="38" dur="1" fill="hold">
-                                          <p:stCondLst>
-                                            <p:cond delay="0"/>
-                                          </p:stCondLst>
-                                        </p:cTn>
-                                        <p:tgtEl>
-                                          <p:spTgt spid="4"/>
-                                        </p:tgtEl>
-                                        <p:attrNameLst>
-                                          <p:attrName>style.visibility</p:attrName>
-                                        </p:attrNameLst>
-                                      </p:cBhvr>
-                                      <p:to>
-                                        <p:strVal val="visible"/>
-                                      </p:to>
-                                    </p:set>
-                                    <p:animEffect transition="in" filter="fade">
-                                      <p:cBhvr>
-                                        <p:cTn id="39" dur="500"/>
-                                        <p:tgtEl>
-                                          <p:spTgt spid="4"/>
-                                        </p:tgtEl>
-                                      </p:cBhvr>
-                                    </p:animEffect>
-                                  </p:childTnLst>
-                                </p:cTn>
-                              </p:par>
-                            </p:childTnLst>
-                          </p:cTn>
-                        </p:par>
-                      </p:childTnLst>
-                    </p:cTn>
-                  </p:par>
-                </p:childTnLst>
-              </p:cTn>
-              <p:prevCondLst>
-                <p:cond evt="onPrev" delay="0">
-                  <p:tgtEl>
-                    <p:sldTgt/>
-                  </p:tgtEl>
-                </p:cond>
-              </p:prevCondLst>
-              <p:nextCondLst>
-                <p:cond evt="onNext" delay="0">
-                  <p:tgtEl>
-                    <p:sldTgt/>
-                  </p:tgtEl>
-                </p:cond>
-              </p:nextCondLst>
-            </p:seq>
-          </p:childTnLst>
-        </p:cTn>
-      </p:par>
-    </p:tnLst>
-    <p:bldLst>
-      <p:bldP spid="3" grpId="0" build="p"/>
-      <p:bldP spid="4" grpId="0" animBg="1"/>
-    </p:bldLst>
-  </p:timing>
 </p:sld>
 </file>
 

</xml_diff>